<commit_message>
Started work on presentation introduction
</commit_message>
<xml_diff>
--- a/presentatie/Classified_MLiP_final_presentation_2.pptx
+++ b/presentatie/Classified_MLiP_final_presentation_2.pptx
@@ -8,22 +8,21 @@
     <p:sldMasterId id="2147483722" r:id="rId4"/>
   </p:sldMasterIdLst>
   <p:notesMasterIdLst>
-    <p:notesMasterId r:id="rId15"/>
+    <p:notesMasterId r:id="rId14"/>
   </p:notesMasterIdLst>
   <p:handoutMasterIdLst>
-    <p:handoutMasterId r:id="rId16"/>
+    <p:handoutMasterId r:id="rId15"/>
   </p:handoutMasterIdLst>
   <p:sldIdLst>
     <p:sldId id="376" r:id="rId5"/>
     <p:sldId id="377" r:id="rId6"/>
-    <p:sldId id="378" r:id="rId7"/>
-    <p:sldId id="379" r:id="rId8"/>
-    <p:sldId id="380" r:id="rId9"/>
-    <p:sldId id="381" r:id="rId10"/>
-    <p:sldId id="382" r:id="rId11"/>
-    <p:sldId id="383" r:id="rId12"/>
-    <p:sldId id="384" r:id="rId13"/>
-    <p:sldId id="385" r:id="rId14"/>
+    <p:sldId id="379" r:id="rId7"/>
+    <p:sldId id="380" r:id="rId8"/>
+    <p:sldId id="381" r:id="rId9"/>
+    <p:sldId id="382" r:id="rId10"/>
+    <p:sldId id="383" r:id="rId11"/>
+    <p:sldId id="384" r:id="rId12"/>
+    <p:sldId id="385" r:id="rId13"/>
   </p:sldIdLst>
   <p:sldSz cx="13003213" cy="9756775"/>
   <p:notesSz cx="6858000" cy="9144000"/>
@@ -154,7 +153,7 @@
   </p:defaultTextStyle>
   <p:extLst>
     <p:ext uri="{EFAFB233-063F-42B5-8137-9DF3F51BA10A}">
-      <p15:sldGuideLst xmlns:p15="http://schemas.microsoft.com/office/powerpoint/2012/main" xmlns="">
+      <p15:sldGuideLst xmlns="" xmlns:p15="http://schemas.microsoft.com/office/powerpoint/2012/main">
         <p15:guide id="1" orient="horz" pos="3073">
           <p15:clr>
             <a:srgbClr val="A4A3A4"/>
@@ -168,7 +167,7 @@
       </p15:sldGuideLst>
     </p:ext>
     <p:ext uri="{2D200454-40CA-4A62-9FC3-DE9A4176ACB9}">
-      <p15:notesGuideLst xmlns:p15="http://schemas.microsoft.com/office/powerpoint/2012/main" xmlns="">
+      <p15:notesGuideLst xmlns="" xmlns:p15="http://schemas.microsoft.com/office/powerpoint/2012/main">
         <p15:guide id="1" orient="horz" pos="2880">
           <p15:clr>
             <a:srgbClr val="A4A3A4"/>
@@ -823,6 +822,114 @@
     </a:lvl9pPr>
   </p:notesStyle>
 </p:notesMaster>
+</file>
+
+<file path=ppt/notesSlides/notesSlide1.xml><?xml version="1.0" encoding="utf-8"?>
+<p:notes xmlns:a="http://schemas.openxmlformats.org/drawingml/2006/main" xmlns:r="http://schemas.openxmlformats.org/officeDocument/2006/relationships" xmlns:p="http://schemas.openxmlformats.org/presentationml/2006/main">
+  <p:cSld>
+    <p:spTree>
+      <p:nvGrpSpPr>
+        <p:cNvPr id="1" name=""/>
+        <p:cNvGrpSpPr/>
+        <p:nvPr/>
+      </p:nvGrpSpPr>
+      <p:grpSpPr>
+        <a:xfrm>
+          <a:off x="0" y="0"/>
+          <a:ext cx="0" cy="0"/>
+          <a:chOff x="0" y="0"/>
+          <a:chExt cx="0" cy="0"/>
+        </a:xfrm>
+      </p:grpSpPr>
+      <p:sp>
+        <p:nvSpPr>
+          <p:cNvPr id="2" name="Tijdelijke aanduiding voor dia-afbeelding 1"/>
+          <p:cNvSpPr>
+            <a:spLocks noGrp="1" noRot="1" noChangeAspect="1"/>
+          </p:cNvSpPr>
+          <p:nvPr>
+            <p:ph type="sldImg"/>
+          </p:nvPr>
+        </p:nvSpPr>
+        <p:spPr/>
+      </p:sp>
+      <p:sp>
+        <p:nvSpPr>
+          <p:cNvPr id="3" name="Tijdelijke aanduiding voor notities 2"/>
+          <p:cNvSpPr>
+            <a:spLocks noGrp="1"/>
+          </p:cNvSpPr>
+          <p:nvPr>
+            <p:ph type="body" idx="1"/>
+          </p:nvPr>
+        </p:nvSpPr>
+        <p:spPr/>
+        <p:txBody>
+          <a:bodyPr/>
+          <a:lstStyle/>
+          <a:p>
+            <a:pPr marL="0" marR="0" indent="0" algn="l" defTabSz="649288" rtl="0" eaLnBrk="0" fontAlgn="base" latinLnBrk="0" hangingPunct="0">
+              <a:lnSpc>
+                <a:spcPct val="100000"/>
+              </a:lnSpc>
+              <a:spcBef>
+                <a:spcPct val="30000"/>
+              </a:spcBef>
+              <a:spcAft>
+                <a:spcPct val="0"/>
+              </a:spcAft>
+              <a:buClrTx/>
+              <a:buSzTx/>
+              <a:buFontTx/>
+              <a:buNone/>
+              <a:tabLst/>
+              <a:defRPr/>
+            </a:pPr>
+            <a:r>
+              <a:rPr lang="nl-NL" dirty="0" smtClean="0"/>
+              <a:t>train.csv </a:t>
+            </a:r>
+            <a:r>
+              <a:rPr lang="en-US" dirty="0" smtClean="0"/>
+              <a:t>(build year, material, number of floors, etc.)</a:t>
+            </a:r>
+          </a:p>
+          <a:p>
+            <a:pPr marL="0" marR="0" indent="0" algn="l" defTabSz="649288" rtl="0" eaLnBrk="0" fontAlgn="base" latinLnBrk="0" hangingPunct="0">
+              <a:lnSpc>
+                <a:spcPct val="100000"/>
+              </a:lnSpc>
+              <a:spcBef>
+                <a:spcPct val="30000"/>
+              </a:spcBef>
+              <a:spcAft>
+                <a:spcPct val="0"/>
+              </a:spcAft>
+              <a:buClrTx/>
+              <a:buSzTx/>
+              <a:buFontTx/>
+              <a:buNone/>
+              <a:tabLst/>
+              <a:defRPr/>
+            </a:pPr>
+            <a:r>
+              <a:rPr lang="en-US" dirty="0" smtClean="0"/>
+              <a:t>macro.csv (e.g. employment, salary, mortality)</a:t>
+            </a:r>
+          </a:p>
+        </p:txBody>
+      </p:sp>
+    </p:spTree>
+    <p:extLst>
+      <p:ext uri="{BB962C8B-B14F-4D97-AF65-F5344CB8AC3E}">
+        <p14:creationId xmlns:p14="http://schemas.microsoft.com/office/powerpoint/2010/main" val="134893625"/>
+      </p:ext>
+    </p:extLst>
+  </p:cSld>
+  <p:clrMapOvr>
+    <a:masterClrMapping/>
+  </p:clrMapOvr>
+</p:notes>
 </file>
 
 <file path=ppt/slideLayouts/slideLayout1.xml><?xml version="1.0" encoding="utf-8"?>
@@ -13162,7 +13269,7 @@
               </a14:hiddenLine>
             </a:ext>
             <a:ext uri="{FAA26D3D-D897-4be2-8F04-BA451C77F1D7}">
-              <ma14:placeholderFlag xmlns="" xmlns:ma14="http://schemas.microsoft.com/office/mac/drawingml/2011/main" val="1"/>
+              <ma14:placeholderFlag xmlns:ma14="http://schemas.microsoft.com/office/mac/drawingml/2011/main" xmlns="" val="1"/>
             </a:ext>
           </a:extLst>
         </p:spPr>
@@ -13223,7 +13330,7 @@
               </a14:hiddenLine>
             </a:ext>
             <a:ext uri="{FAA26D3D-D897-4be2-8F04-BA451C77F1D7}">
-              <ma14:placeholderFlag xmlns="" xmlns:ma14="http://schemas.microsoft.com/office/mac/drawingml/2011/main" val="1"/>
+              <ma14:placeholderFlag xmlns:ma14="http://schemas.microsoft.com/office/mac/drawingml/2011/main" xmlns="" val="1"/>
             </a:ext>
           </a:extLst>
         </p:spPr>
@@ -13946,7 +14053,7 @@
               </a14:hiddenLine>
             </a:ext>
             <a:ext uri="{FAA26D3D-D897-4be2-8F04-BA451C77F1D7}">
-              <ma14:placeholderFlag xmlns="" xmlns:ma14="http://schemas.microsoft.com/office/mac/drawingml/2011/main" val="1"/>
+              <ma14:placeholderFlag xmlns:ma14="http://schemas.microsoft.com/office/mac/drawingml/2011/main" xmlns="" val="1"/>
             </a:ext>
           </a:extLst>
         </p:spPr>
@@ -14007,7 +14114,7 @@
               </a14:hiddenLine>
             </a:ext>
             <a:ext uri="{FAA26D3D-D897-4be2-8F04-BA451C77F1D7}">
-              <ma14:placeholderFlag xmlns="" xmlns:ma14="http://schemas.microsoft.com/office/mac/drawingml/2011/main" val="1"/>
+              <ma14:placeholderFlag xmlns:ma14="http://schemas.microsoft.com/office/mac/drawingml/2011/main" xmlns="" val="1"/>
             </a:ext>
           </a:extLst>
         </p:spPr>
@@ -14692,7 +14799,7 @@
               </a14:hiddenLine>
             </a:ext>
             <a:ext uri="{FAA26D3D-D897-4be2-8F04-BA451C77F1D7}">
-              <ma14:placeholderFlag xmlns="" xmlns:ma14="http://schemas.microsoft.com/office/mac/drawingml/2011/main" val="1"/>
+              <ma14:placeholderFlag xmlns:ma14="http://schemas.microsoft.com/office/mac/drawingml/2011/main" xmlns="" val="1"/>
             </a:ext>
           </a:extLst>
         </p:spPr>
@@ -14753,7 +14860,7 @@
               </a14:hiddenLine>
             </a:ext>
             <a:ext uri="{FAA26D3D-D897-4be2-8F04-BA451C77F1D7}">
-              <ma14:placeholderFlag xmlns="" xmlns:ma14="http://schemas.microsoft.com/office/mac/drawingml/2011/main" val="1"/>
+              <ma14:placeholderFlag xmlns:ma14="http://schemas.microsoft.com/office/mac/drawingml/2011/main" xmlns="" val="1"/>
             </a:ext>
           </a:extLst>
         </p:spPr>
@@ -15461,7 +15568,7 @@
               </a14:hiddenLine>
             </a:ext>
             <a:ext uri="{FAA26D3D-D897-4be2-8F04-BA451C77F1D7}">
-              <ma14:placeholderFlag xmlns="" xmlns:ma14="http://schemas.microsoft.com/office/mac/drawingml/2011/main" val="1"/>
+              <ma14:placeholderFlag xmlns:ma14="http://schemas.microsoft.com/office/mac/drawingml/2011/main" xmlns="" val="1"/>
             </a:ext>
           </a:extLst>
         </p:spPr>
@@ -15522,7 +15629,7 @@
               </a14:hiddenLine>
             </a:ext>
             <a:ext uri="{FAA26D3D-D897-4be2-8F04-BA451C77F1D7}">
-              <ma14:placeholderFlag xmlns="" xmlns:ma14="http://schemas.microsoft.com/office/mac/drawingml/2011/main" val="1"/>
+              <ma14:placeholderFlag xmlns:ma14="http://schemas.microsoft.com/office/mac/drawingml/2011/main" xmlns="" val="1"/>
             </a:ext>
           </a:extLst>
         </p:spPr>
@@ -16219,22 +16326,14 @@
           <a:lstStyle/>
           <a:p>
             <a:r>
-              <a:rPr lang="nl-NL" dirty="0" err="1" smtClean="0"/>
+              <a:rPr lang="en-US" dirty="0" err="1" smtClean="0"/>
               <a:t>Sberbank</a:t>
             </a:r>
             <a:r>
-              <a:rPr lang="nl-NL" dirty="0" smtClean="0"/>
-              <a:t> Russian </a:t>
-            </a:r>
-            <a:r>
-              <a:rPr lang="nl-NL" dirty="0" err="1" smtClean="0"/>
-              <a:t>Housing</a:t>
-            </a:r>
-            <a:r>
-              <a:rPr lang="nl-NL" dirty="0" smtClean="0"/>
-              <a:t> Market</a:t>
-            </a:r>
-            <a:endParaRPr lang="nl-NL" dirty="0"/>
+              <a:rPr lang="en-US" dirty="0" smtClean="0"/>
+              <a:t> Russian Housing Market</a:t>
+            </a:r>
+            <a:endParaRPr lang="en-US" dirty="0"/>
           </a:p>
         </p:txBody>
       </p:sp>
@@ -16254,84 +16353,83 @@
           <a:lstStyle/>
           <a:p>
             <a:r>
-              <a:rPr lang="nl-NL" sz="4000" dirty="0" smtClean="0">
+              <a:rPr lang="en-US" sz="4000" dirty="0" smtClean="0">
                 <a:latin typeface="+mj-lt"/>
               </a:rPr>
-              <a:t>Team </a:t>
-            </a:r>
-            <a:r>
-              <a:rPr lang="nl-NL" sz="4000" dirty="0" err="1" smtClean="0">
-                <a:latin typeface="+mj-lt"/>
-              </a:rPr>
-              <a:t>Classified</a:t>
-            </a:r>
-            <a:endParaRPr lang="nl-NL" sz="4000" dirty="0" smtClean="0">
-              <a:latin typeface="+mj-lt"/>
-            </a:endParaRPr>
-          </a:p>
-          <a:p>
-            <a:endParaRPr lang="nl-NL" dirty="0"/>
+              <a:t>Team Classified</a:t>
+            </a:r>
+          </a:p>
+          <a:p>
+            <a:endParaRPr lang="en-US" dirty="0" smtClean="0"/>
           </a:p>
           <a:p>
             <a:pPr algn="l"/>
             <a:r>
-              <a:rPr lang="nl-NL" dirty="0"/>
+              <a:rPr lang="en-US" dirty="0" smtClean="0"/>
               <a:t>Jordi </a:t>
             </a:r>
             <a:r>
-              <a:rPr lang="nl-NL" dirty="0" err="1" smtClean="0"/>
+              <a:rPr lang="en-US" dirty="0" err="1" smtClean="0"/>
               <a:t>Beernink</a:t>
             </a:r>
-            <a:endParaRPr lang="nl-NL" dirty="0" smtClean="0"/>
+            <a:endParaRPr lang="en-US" dirty="0" smtClean="0"/>
           </a:p>
           <a:p>
             <a:pPr algn="l"/>
             <a:r>
-              <a:rPr lang="nl-NL" dirty="0" smtClean="0"/>
-              <a:t>Roel Bouman</a:t>
-            </a:r>
+              <a:rPr lang="en-US" dirty="0" err="1" smtClean="0"/>
+              <a:t>Roel</a:t>
+            </a:r>
+            <a:r>
+              <a:rPr lang="en-US" dirty="0" smtClean="0"/>
+              <a:t> </a:t>
+            </a:r>
+            <a:r>
+              <a:rPr lang="en-US" dirty="0" err="1" smtClean="0"/>
+              <a:t>Bouman</a:t>
+            </a:r>
+            <a:endParaRPr lang="en-US" dirty="0" smtClean="0"/>
           </a:p>
           <a:p>
             <a:pPr algn="l"/>
             <a:r>
-              <a:rPr lang="nl-NL" dirty="0" smtClean="0"/>
+              <a:rPr lang="en-US" dirty="0" smtClean="0"/>
               <a:t>Jeffrey </a:t>
             </a:r>
             <a:r>
-              <a:rPr lang="nl-NL" dirty="0" err="1" smtClean="0"/>
+              <a:rPr lang="en-US" dirty="0" err="1" smtClean="0"/>
               <a:t>Luppes</a:t>
             </a:r>
-            <a:endParaRPr lang="nl-NL" dirty="0" smtClean="0"/>
+            <a:endParaRPr lang="en-US" dirty="0" smtClean="0"/>
           </a:p>
           <a:p>
             <a:pPr algn="l"/>
             <a:r>
-              <a:rPr lang="nl-NL" dirty="0" err="1" smtClean="0"/>
+              <a:rPr lang="en-US" dirty="0" err="1" smtClean="0"/>
               <a:t>Gerdriaan</a:t>
             </a:r>
             <a:r>
-              <a:rPr lang="nl-NL" dirty="0" smtClean="0"/>
+              <a:rPr lang="en-US" dirty="0" smtClean="0"/>
               <a:t> Mulder</a:t>
             </a:r>
-            <a:endParaRPr lang="nl-NL" dirty="0"/>
           </a:p>
           <a:p>
             <a:pPr algn="l"/>
             <a:r>
-              <a:rPr lang="nl-NL" dirty="0" smtClean="0"/>
+              <a:rPr lang="en-US" dirty="0" smtClean="0"/>
               <a:t>Thijs </a:t>
             </a:r>
             <a:r>
-              <a:rPr lang="nl-NL" dirty="0" err="1" smtClean="0"/>
+              <a:rPr lang="en-US" dirty="0" err="1" smtClean="0"/>
               <a:t>Werrij</a:t>
             </a:r>
-            <a:endParaRPr lang="nl-NL" dirty="0" smtClean="0"/>
-          </a:p>
-          <a:p>
-            <a:endParaRPr lang="nl-NL" dirty="0" smtClean="0"/>
-          </a:p>
-          <a:p>
-            <a:endParaRPr lang="nl-NL" dirty="0"/>
+            <a:endParaRPr lang="en-US" dirty="0" smtClean="0"/>
+          </a:p>
+          <a:p>
+            <a:endParaRPr lang="en-US" dirty="0" smtClean="0"/>
+          </a:p>
+          <a:p>
+            <a:endParaRPr lang="en-US" dirty="0"/>
           </a:p>
         </p:txBody>
       </p:sp>
@@ -16339,204 +16437,6 @@
     <p:extLst>
       <p:ext uri="{BB962C8B-B14F-4D97-AF65-F5344CB8AC3E}">
         <p14:creationId xmlns:p14="http://schemas.microsoft.com/office/powerpoint/2010/main" val="30353527"/>
-      </p:ext>
-    </p:extLst>
-  </p:cSld>
-  <p:clrMapOvr>
-    <a:masterClrMapping/>
-  </p:clrMapOvr>
-  <p:transition spd="med">
-    <p:fade/>
-  </p:transition>
-  <p:timing>
-    <p:tnLst>
-      <p:par>
-        <p:cTn id="1" dur="indefinite" restart="never" nodeType="tmRoot"/>
-      </p:par>
-    </p:tnLst>
-  </p:timing>
-</p:sld>
-</file>
-
-<file path=ppt/slides/slide10.xml><?xml version="1.0" encoding="utf-8"?>
-<p:sld xmlns:a="http://schemas.openxmlformats.org/drawingml/2006/main" xmlns:r="http://schemas.openxmlformats.org/officeDocument/2006/relationships" xmlns:p="http://schemas.openxmlformats.org/presentationml/2006/main">
-  <p:cSld>
-    <p:spTree>
-      <p:nvGrpSpPr>
-        <p:cNvPr id="1" name=""/>
-        <p:cNvGrpSpPr/>
-        <p:nvPr/>
-      </p:nvGrpSpPr>
-      <p:grpSpPr>
-        <a:xfrm>
-          <a:off x="0" y="0"/>
-          <a:ext cx="0" cy="0"/>
-          <a:chOff x="0" y="0"/>
-          <a:chExt cx="0" cy="0"/>
-        </a:xfrm>
-      </p:grpSpPr>
-      <p:sp>
-        <p:nvSpPr>
-          <p:cNvPr id="4" name="Titel 3"/>
-          <p:cNvSpPr>
-            <a:spLocks noGrp="1"/>
-          </p:cNvSpPr>
-          <p:nvPr>
-            <p:ph type="title"/>
-          </p:nvPr>
-        </p:nvSpPr>
-        <p:spPr/>
-        <p:txBody>
-          <a:bodyPr/>
-          <a:lstStyle/>
-          <a:p>
-            <a:r>
-              <a:rPr lang="nl-NL" dirty="0" err="1" smtClean="0"/>
-              <a:t>Sberbank</a:t>
-            </a:r>
-            <a:r>
-              <a:rPr lang="nl-NL" dirty="0" smtClean="0"/>
-              <a:t> Russian </a:t>
-            </a:r>
-            <a:r>
-              <a:rPr lang="nl-NL" dirty="0" err="1" smtClean="0"/>
-              <a:t>Housing</a:t>
-            </a:r>
-            <a:r>
-              <a:rPr lang="nl-NL" dirty="0" smtClean="0"/>
-              <a:t> Market</a:t>
-            </a:r>
-            <a:endParaRPr lang="nl-NL" dirty="0"/>
-          </a:p>
-        </p:txBody>
-      </p:sp>
-      <p:sp>
-        <p:nvSpPr>
-          <p:cNvPr id="5" name="Tijdelijke aanduiding voor inhoud 4"/>
-          <p:cNvSpPr>
-            <a:spLocks noGrp="1"/>
-          </p:cNvSpPr>
-          <p:nvPr>
-            <p:ph idx="1"/>
-          </p:nvPr>
-        </p:nvSpPr>
-        <p:spPr/>
-        <p:txBody>
-          <a:bodyPr/>
-          <a:lstStyle/>
-          <a:p>
-            <a:r>
-              <a:rPr lang="nl-NL" sz="4000" dirty="0" smtClean="0">
-                <a:latin typeface="+mj-lt"/>
-              </a:rPr>
-              <a:t>Team </a:t>
-            </a:r>
-            <a:r>
-              <a:rPr lang="nl-NL" sz="4000" dirty="0" err="1" smtClean="0">
-                <a:latin typeface="+mj-lt"/>
-              </a:rPr>
-              <a:t>Classified</a:t>
-            </a:r>
-            <a:endParaRPr lang="nl-NL" sz="4000" dirty="0" smtClean="0">
-              <a:latin typeface="+mj-lt"/>
-            </a:endParaRPr>
-          </a:p>
-          <a:p>
-            <a:endParaRPr lang="nl-NL" dirty="0"/>
-          </a:p>
-          <a:p>
-            <a:pPr marL="457200" indent="-457200" algn="l">
-              <a:buFont typeface="Arial" panose="020B0604020202020204" pitchFamily="34" charset="0"/>
-              <a:buChar char="•"/>
-            </a:pPr>
-            <a:r>
-              <a:rPr lang="nl-NL" dirty="0" err="1" smtClean="0"/>
-              <a:t>Maybe</a:t>
-            </a:r>
-            <a:r>
-              <a:rPr lang="nl-NL" dirty="0" smtClean="0"/>
-              <a:t> a short</a:t>
-            </a:r>
-          </a:p>
-          <a:p>
-            <a:pPr marL="457200" indent="-457200" algn="l">
-              <a:buFont typeface="Arial" panose="020B0604020202020204" pitchFamily="34" charset="0"/>
-              <a:buChar char="•"/>
-            </a:pPr>
-            <a:r>
-              <a:rPr lang="nl-NL" dirty="0" smtClean="0"/>
-              <a:t>Summary of stuff</a:t>
-            </a:r>
-          </a:p>
-          <a:p>
-            <a:pPr marL="457200" indent="-457200" algn="l">
-              <a:buFont typeface="Arial" panose="020B0604020202020204" pitchFamily="34" charset="0"/>
-              <a:buChar char="•"/>
-            </a:pPr>
-            <a:r>
-              <a:rPr lang="nl-NL" dirty="0" err="1" smtClean="0"/>
-              <a:t>Discussed</a:t>
-            </a:r>
-            <a:endParaRPr lang="nl-NL" dirty="0" smtClean="0"/>
-          </a:p>
-          <a:p>
-            <a:pPr marL="457200" indent="-457200" algn="l">
-              <a:buFont typeface="Arial" panose="020B0604020202020204" pitchFamily="34" charset="0"/>
-              <a:buChar char="•"/>
-            </a:pPr>
-            <a:endParaRPr lang="nl-NL" dirty="0"/>
-          </a:p>
-          <a:p>
-            <a:r>
-              <a:rPr lang="nl-NL" dirty="0" err="1" smtClean="0"/>
-              <a:t>Thanks</a:t>
-            </a:r>
-            <a:r>
-              <a:rPr lang="nl-NL" dirty="0" smtClean="0"/>
-              <a:t> </a:t>
-            </a:r>
-            <a:r>
-              <a:rPr lang="nl-NL" dirty="0" err="1" smtClean="0"/>
-              <a:t>for</a:t>
-            </a:r>
-            <a:r>
-              <a:rPr lang="nl-NL" dirty="0" smtClean="0"/>
-              <a:t> </a:t>
-            </a:r>
-            <a:r>
-              <a:rPr lang="nl-NL" dirty="0" err="1" smtClean="0"/>
-              <a:t>your</a:t>
-            </a:r>
-            <a:r>
-              <a:rPr lang="nl-NL" dirty="0" smtClean="0"/>
-              <a:t> attention!</a:t>
-            </a:r>
-          </a:p>
-          <a:p>
-            <a:r>
-              <a:rPr lang="nl-NL" dirty="0" err="1" smtClean="0"/>
-              <a:t>Any</a:t>
-            </a:r>
-            <a:r>
-              <a:rPr lang="nl-NL" dirty="0" smtClean="0"/>
-              <a:t> </a:t>
-            </a:r>
-            <a:r>
-              <a:rPr lang="nl-NL" dirty="0" err="1" smtClean="0"/>
-              <a:t>questions</a:t>
-            </a:r>
-            <a:r>
-              <a:rPr lang="nl-NL" dirty="0" smtClean="0"/>
-              <a:t>?</a:t>
-            </a:r>
-            <a:endParaRPr lang="nl-NL" dirty="0"/>
-          </a:p>
-        </p:txBody>
-      </p:sp>
-    </p:spTree>
-    <p:extLst>
-      <p:ext uri="{BB962C8B-B14F-4D97-AF65-F5344CB8AC3E}">
-        <p14:creationId xmlns:p14="http://schemas.microsoft.com/office/powerpoint/2010/main" val="2891404509"/>
       </p:ext>
     </p:extLst>
   </p:cSld>
@@ -16589,24 +16489,8 @@
           <a:lstStyle/>
           <a:p>
             <a:r>
-              <a:rPr lang="nl-NL" dirty="0" err="1" smtClean="0"/>
-              <a:t>Introduction</a:t>
-            </a:r>
-            <a:r>
-              <a:rPr lang="nl-NL" dirty="0" smtClean="0"/>
-              <a:t> </a:t>
-            </a:r>
-            <a:r>
-              <a:rPr lang="nl-NL" dirty="0" smtClean="0"/>
-              <a:t>- </a:t>
-            </a:r>
-            <a:r>
-              <a:rPr lang="nl-NL" dirty="0" smtClean="0"/>
-              <a:t>The </a:t>
-            </a:r>
-            <a:r>
               <a:rPr lang="en-US" dirty="0" smtClean="0"/>
-              <a:t>competition</a:t>
+              <a:t>Introduction - The competition</a:t>
             </a:r>
             <a:endParaRPr lang="en-US" dirty="0"/>
           </a:p>
@@ -16627,7 +16511,73 @@
           <a:bodyPr/>
           <a:lstStyle/>
           <a:p>
-            <a:endParaRPr lang="nl-NL"/>
+            <a:r>
+              <a:rPr lang="en-US" dirty="0" smtClean="0"/>
+              <a:t>Predict prices of housing in Moscow area</a:t>
+            </a:r>
+          </a:p>
+          <a:p>
+            <a:endParaRPr lang="en-US" dirty="0" smtClean="0"/>
+          </a:p>
+          <a:p>
+            <a:endParaRPr lang="en-US" dirty="0" smtClean="0"/>
+          </a:p>
+          <a:p>
+            <a:r>
+              <a:rPr lang="en-US" dirty="0" smtClean="0"/>
+              <a:t>Data set consists of:</a:t>
+            </a:r>
+          </a:p>
+          <a:p>
+            <a:endParaRPr lang="en-US" dirty="0" smtClean="0"/>
+          </a:p>
+          <a:p>
+            <a:pPr marL="457200" indent="-457200">
+              <a:buFont typeface="Arial" panose="020B0604020202020204" pitchFamily="34" charset="0"/>
+              <a:buChar char="•"/>
+            </a:pPr>
+            <a:r>
+              <a:rPr lang="en-US" dirty="0" smtClean="0"/>
+              <a:t>t</a:t>
+            </a:r>
+            <a:r>
+              <a:rPr lang="en-US" dirty="0" smtClean="0"/>
+              <a:t>rain.csv, </a:t>
+            </a:r>
+            <a:r>
+              <a:rPr lang="en-US" dirty="0" smtClean="0"/>
+              <a:t>30473 entries with information about houses/apartments</a:t>
+            </a:r>
+          </a:p>
+          <a:p>
+            <a:pPr marL="457200" indent="-457200">
+              <a:buFont typeface="Arial" panose="020B0604020202020204" pitchFamily="34" charset="0"/>
+              <a:buChar char="•"/>
+            </a:pPr>
+            <a:endParaRPr lang="en-US" dirty="0"/>
+          </a:p>
+          <a:p>
+            <a:pPr marL="457200" indent="-457200">
+              <a:buFont typeface="Arial" panose="020B0604020202020204" pitchFamily="34" charset="0"/>
+              <a:buChar char="•"/>
+            </a:pPr>
+            <a:r>
+              <a:rPr lang="en-US" dirty="0" smtClean="0"/>
+              <a:t>macro.csv, </a:t>
+            </a:r>
+            <a:r>
+              <a:rPr lang="en-US" dirty="0" smtClean="0"/>
+              <a:t>data on Russia's </a:t>
+            </a:r>
+            <a:r>
+              <a:rPr lang="en-US" dirty="0" err="1" smtClean="0"/>
+              <a:t>macroeconomy</a:t>
+            </a:r>
+            <a:r>
+              <a:rPr lang="en-US" dirty="0" smtClean="0"/>
+              <a:t> and financial sector</a:t>
+            </a:r>
+            <a:endParaRPr lang="en-US" dirty="0"/>
           </a:p>
         </p:txBody>
       </p:sp>
@@ -16687,20 +16637,8 @@
           <a:lstStyle/>
           <a:p>
             <a:r>
-              <a:rPr lang="nl-NL" dirty="0" err="1" smtClean="0"/>
-              <a:t>Introduction</a:t>
-            </a:r>
-            <a:r>
-              <a:rPr lang="nl-NL" dirty="0" smtClean="0"/>
-              <a:t> </a:t>
-            </a:r>
-            <a:r>
-              <a:rPr lang="nl-NL" dirty="0" smtClean="0"/>
-              <a:t>- </a:t>
-            </a:r>
-            <a:r>
-              <a:rPr lang="nl-NL" dirty="0" smtClean="0"/>
-              <a:t>The data set</a:t>
+              <a:rPr lang="nl-NL" dirty="0" smtClean="0"/>
+              <a:t>Approach - Pre-processing</a:t>
             </a:r>
             <a:endParaRPr lang="nl-NL" dirty="0"/>
           </a:p>
@@ -16728,7 +16666,7 @@
     </p:spTree>
     <p:extLst>
       <p:ext uri="{BB962C8B-B14F-4D97-AF65-F5344CB8AC3E}">
-        <p14:creationId xmlns:p14="http://schemas.microsoft.com/office/powerpoint/2010/main" val="1649803900"/>
+        <p14:creationId xmlns:p14="http://schemas.microsoft.com/office/powerpoint/2010/main" val="1753334808"/>
       </p:ext>
     </p:extLst>
   </p:cSld>
@@ -16782,7 +16720,11 @@
           <a:p>
             <a:r>
               <a:rPr lang="nl-NL" dirty="0" smtClean="0"/>
-              <a:t>Approach - Pre-processing</a:t>
+              <a:t>Approach - </a:t>
+            </a:r>
+            <a:r>
+              <a:rPr lang="nl-NL" dirty="0" err="1" smtClean="0"/>
+              <a:t>Methods</a:t>
             </a:r>
             <a:endParaRPr lang="nl-NL" dirty="0"/>
           </a:p>
@@ -16810,7 +16752,7 @@
     </p:spTree>
     <p:extLst>
       <p:ext uri="{BB962C8B-B14F-4D97-AF65-F5344CB8AC3E}">
-        <p14:creationId xmlns:p14="http://schemas.microsoft.com/office/powerpoint/2010/main" val="1753334808"/>
+        <p14:creationId xmlns:p14="http://schemas.microsoft.com/office/powerpoint/2010/main" val="2768329112"/>
       </p:ext>
     </p:extLst>
   </p:cSld>
@@ -16863,12 +16805,8 @@
           <a:lstStyle/>
           <a:p>
             <a:r>
-              <a:rPr lang="nl-NL" dirty="0" smtClean="0"/>
-              <a:t>Approach - </a:t>
-            </a:r>
-            <a:r>
               <a:rPr lang="nl-NL" dirty="0" err="1" smtClean="0"/>
-              <a:t>Methods</a:t>
+              <a:t>Results</a:t>
             </a:r>
             <a:endParaRPr lang="nl-NL" dirty="0"/>
           </a:p>
@@ -16896,7 +16834,7 @@
     </p:spTree>
     <p:extLst>
       <p:ext uri="{BB962C8B-B14F-4D97-AF65-F5344CB8AC3E}">
-        <p14:creationId xmlns:p14="http://schemas.microsoft.com/office/powerpoint/2010/main" val="2768329112"/>
+        <p14:creationId xmlns:p14="http://schemas.microsoft.com/office/powerpoint/2010/main" val="126911451"/>
       </p:ext>
     </p:extLst>
   </p:cSld>
@@ -16948,10 +16886,6 @@
           <a:bodyPr/>
           <a:lstStyle/>
           <a:p>
-            <a:r>
-              <a:rPr lang="nl-NL" dirty="0" err="1" smtClean="0"/>
-              <a:t>Results</a:t>
-            </a:r>
             <a:endParaRPr lang="nl-NL" dirty="0"/>
           </a:p>
         </p:txBody>
@@ -16971,14 +16905,18 @@
           <a:bodyPr/>
           <a:lstStyle/>
           <a:p>
-            <a:endParaRPr lang="nl-NL"/>
+            <a:r>
+              <a:rPr lang="en-US" dirty="0"/>
+              <a:t>(discuss other things worth mentioning here)</a:t>
+            </a:r>
+            <a:endParaRPr lang="nl-NL" dirty="0"/>
           </a:p>
         </p:txBody>
       </p:sp>
     </p:spTree>
     <p:extLst>
       <p:ext uri="{BB962C8B-B14F-4D97-AF65-F5344CB8AC3E}">
-        <p14:creationId xmlns:p14="http://schemas.microsoft.com/office/powerpoint/2010/main" val="126911451"/>
+        <p14:creationId xmlns:p14="http://schemas.microsoft.com/office/powerpoint/2010/main" val="986293090"/>
       </p:ext>
     </p:extLst>
   </p:cSld>
@@ -17030,6 +16968,18 @@
           <a:bodyPr/>
           <a:lstStyle/>
           <a:p>
+            <a:r>
+              <a:rPr lang="nl-NL" dirty="0" err="1" smtClean="0"/>
+              <a:t>Further</a:t>
+            </a:r>
+            <a:r>
+              <a:rPr lang="nl-NL" dirty="0" smtClean="0"/>
+              <a:t> </a:t>
+            </a:r>
+            <a:r>
+              <a:rPr lang="nl-NL" dirty="0" err="1" smtClean="0"/>
+              <a:t>work</a:t>
+            </a:r>
             <a:endParaRPr lang="nl-NL" dirty="0"/>
           </a:p>
         </p:txBody>
@@ -17049,10 +16999,6 @@
           <a:bodyPr/>
           <a:lstStyle/>
           <a:p>
-            <a:r>
-              <a:rPr lang="en-US" dirty="0"/>
-              <a:t>(discuss other things worth mentioning here)</a:t>
-            </a:r>
             <a:endParaRPr lang="nl-NL" dirty="0"/>
           </a:p>
         </p:txBody>
@@ -17060,7 +17006,7 @@
     </p:spTree>
     <p:extLst>
       <p:ext uri="{BB962C8B-B14F-4D97-AF65-F5344CB8AC3E}">
-        <p14:creationId xmlns:p14="http://schemas.microsoft.com/office/powerpoint/2010/main" val="986293090"/>
+        <p14:creationId xmlns:p14="http://schemas.microsoft.com/office/powerpoint/2010/main" val="3234233365"/>
       </p:ext>
     </p:extLst>
   </p:cSld>
@@ -17114,15 +17060,7 @@
           <a:p>
             <a:r>
               <a:rPr lang="nl-NL" dirty="0" err="1" smtClean="0"/>
-              <a:t>Further</a:t>
-            </a:r>
-            <a:r>
-              <a:rPr lang="nl-NL" dirty="0" smtClean="0"/>
-              <a:t> </a:t>
-            </a:r>
-            <a:r>
-              <a:rPr lang="nl-NL" dirty="0" err="1" smtClean="0"/>
-              <a:t>work</a:t>
+              <a:t>Conclusion</a:t>
             </a:r>
             <a:endParaRPr lang="nl-NL" dirty="0"/>
           </a:p>
@@ -17143,14 +17081,14 @@
           <a:bodyPr/>
           <a:lstStyle/>
           <a:p>
-            <a:endParaRPr lang="nl-NL" dirty="0"/>
+            <a:endParaRPr lang="nl-NL"/>
           </a:p>
         </p:txBody>
       </p:sp>
     </p:spTree>
     <p:extLst>
       <p:ext uri="{BB962C8B-B14F-4D97-AF65-F5344CB8AC3E}">
-        <p14:creationId xmlns:p14="http://schemas.microsoft.com/office/powerpoint/2010/main" val="3234233365"/>
+        <p14:creationId xmlns:p14="http://schemas.microsoft.com/office/powerpoint/2010/main" val="3638369078"/>
       </p:ext>
     </p:extLst>
   </p:cSld>
@@ -17189,7 +17127,7 @@
       </p:grpSpPr>
       <p:sp>
         <p:nvSpPr>
-          <p:cNvPr id="2" name="Titel 1"/>
+          <p:cNvPr id="4" name="Titel 3"/>
           <p:cNvSpPr>
             <a:spLocks noGrp="1"/>
           </p:cNvSpPr>
@@ -17204,7 +17142,19 @@
           <a:p>
             <a:r>
               <a:rPr lang="nl-NL" dirty="0" err="1" smtClean="0"/>
-              <a:t>Conclusion</a:t>
+              <a:t>Sberbank</a:t>
+            </a:r>
+            <a:r>
+              <a:rPr lang="nl-NL" dirty="0" smtClean="0"/>
+              <a:t> Russian </a:t>
+            </a:r>
+            <a:r>
+              <a:rPr lang="nl-NL" dirty="0" err="1" smtClean="0"/>
+              <a:t>Housing</a:t>
+            </a:r>
+            <a:r>
+              <a:rPr lang="nl-NL" dirty="0" smtClean="0"/>
+              <a:t> Market</a:t>
             </a:r>
             <a:endParaRPr lang="nl-NL" dirty="0"/>
           </a:p>
@@ -17212,7 +17162,7 @@
       </p:sp>
       <p:sp>
         <p:nvSpPr>
-          <p:cNvPr id="3" name="Tijdelijke aanduiding voor inhoud 2"/>
+          <p:cNvPr id="5" name="Tijdelijke aanduiding voor inhoud 4"/>
           <p:cNvSpPr>
             <a:spLocks noGrp="1"/>
           </p:cNvSpPr>
@@ -17225,14 +17175,72 @@
           <a:bodyPr/>
           <a:lstStyle/>
           <a:p>
-            <a:endParaRPr lang="nl-NL"/>
+            <a:r>
+              <a:rPr lang="en-US" sz="4000" dirty="0" smtClean="0">
+                <a:latin typeface="+mj-lt"/>
+              </a:rPr>
+              <a:t>Team Classified</a:t>
+            </a:r>
+          </a:p>
+          <a:p>
+            <a:endParaRPr lang="en-US" dirty="0" smtClean="0"/>
+          </a:p>
+          <a:p>
+            <a:pPr marL="457200" indent="-457200" algn="l">
+              <a:buFont typeface="Arial" panose="020B0604020202020204" pitchFamily="34" charset="0"/>
+              <a:buChar char="•"/>
+            </a:pPr>
+            <a:r>
+              <a:rPr lang="en-US" dirty="0" smtClean="0"/>
+              <a:t>Maybe a short</a:t>
+            </a:r>
+          </a:p>
+          <a:p>
+            <a:pPr marL="457200" indent="-457200" algn="l">
+              <a:buFont typeface="Arial" panose="020B0604020202020204" pitchFamily="34" charset="0"/>
+              <a:buChar char="•"/>
+            </a:pPr>
+            <a:r>
+              <a:rPr lang="en-US" dirty="0" smtClean="0"/>
+              <a:t>Summary of stuff</a:t>
+            </a:r>
+          </a:p>
+          <a:p>
+            <a:pPr marL="457200" indent="-457200" algn="l">
+              <a:buFont typeface="Arial" panose="020B0604020202020204" pitchFamily="34" charset="0"/>
+              <a:buChar char="•"/>
+            </a:pPr>
+            <a:r>
+              <a:rPr lang="en-US" dirty="0" smtClean="0"/>
+              <a:t>Discussed</a:t>
+            </a:r>
+          </a:p>
+          <a:p>
+            <a:pPr marL="457200" indent="-457200" algn="l">
+              <a:buFont typeface="Arial" panose="020B0604020202020204" pitchFamily="34" charset="0"/>
+              <a:buChar char="•"/>
+            </a:pPr>
+            <a:endParaRPr lang="en-US" dirty="0" smtClean="0"/>
+          </a:p>
+          <a:p>
+            <a:r>
+              <a:rPr lang="en-US" dirty="0" smtClean="0"/>
+              <a:t>Thanks for your attention!</a:t>
+            </a:r>
+          </a:p>
+          <a:p>
+            <a:r>
+              <a:rPr lang="en-US" dirty="0" smtClean="0"/>
+              <a:t>Any questions?</a:t>
+            </a:r>
+            <a:endParaRPr lang="en-US" dirty="0"/>
           </a:p>
         </p:txBody>
       </p:sp>
     </p:spTree>
     <p:extLst>
       <p:ext uri="{BB962C8B-B14F-4D97-AF65-F5344CB8AC3E}">
-        <p14:creationId xmlns:p14="http://schemas.microsoft.com/office/powerpoint/2010/main" val="3638369078"/>
+        <p14:creationId xmlns:p14="http://schemas.microsoft.com/office/powerpoint/2010/main" val="2891404509"/>
       </p:ext>
     </p:extLst>
   </p:cSld>
@@ -17586,7 +17594,7 @@
   <a:extraClrSchemeLst/>
   <a:extLst>
     <a:ext uri="{05A4C25C-085E-4340-85A3-A5531E510DB2}">
-      <thm15:themeFamily xmlns:thm15="http://schemas.microsoft.com/office/thememl/2012/main" xmlns="" name="RU_Powerpoint_Sjabloon_1701_01" id="{828DFFF2-5273-C34C-ABD2-9CECC33A392B}" vid="{23D08B45-5954-D846-9929-9B0FE5D401C8}"/>
+      <thm15:themeFamily xmlns="" xmlns:thm15="http://schemas.microsoft.com/office/thememl/2012/main" name="RU_Powerpoint_Sjabloon_1701_01" id="{828DFFF2-5273-C34C-ABD2-9CECC33A392B}" vid="{23D08B45-5954-D846-9929-9B0FE5D401C8}"/>
     </a:ext>
   </a:extLst>
 </a:theme>
@@ -17926,7 +17934,7 @@
   <a:extraClrSchemeLst/>
   <a:extLst>
     <a:ext uri="{05A4C25C-085E-4340-85A3-A5531E510DB2}">
-      <thm15:themeFamily xmlns:thm15="http://schemas.microsoft.com/office/thememl/2012/main" xmlns="" name="RU_Powerpoint_Sjabloon_1701_01" id="{828DFFF2-5273-C34C-ABD2-9CECC33A392B}" vid="{74A80C64-C312-7D45-AC0F-390CF2F274F6}"/>
+      <thm15:themeFamily xmlns="" xmlns:thm15="http://schemas.microsoft.com/office/thememl/2012/main" name="RU_Powerpoint_Sjabloon_1701_01" id="{828DFFF2-5273-C34C-ABD2-9CECC33A392B}" vid="{74A80C64-C312-7D45-AC0F-390CF2F274F6}"/>
     </a:ext>
   </a:extLst>
 </a:theme>
@@ -18266,7 +18274,7 @@
   <a:extraClrSchemeLst/>
   <a:extLst>
     <a:ext uri="{05A4C25C-085E-4340-85A3-A5531E510DB2}">
-      <thm15:themeFamily xmlns:thm15="http://schemas.microsoft.com/office/thememl/2012/main" xmlns="" name="RU_Powerpoint_Sjabloon_1701_01" id="{828DFFF2-5273-C34C-ABD2-9CECC33A392B}" vid="{D9D59CB7-FFB0-994D-A0FE-D55D805C5F99}"/>
+      <thm15:themeFamily xmlns="" xmlns:thm15="http://schemas.microsoft.com/office/thememl/2012/main" name="RU_Powerpoint_Sjabloon_1701_01" id="{828DFFF2-5273-C34C-ABD2-9CECC33A392B}" vid="{D9D59CB7-FFB0-994D-A0FE-D55D805C5F99}"/>
     </a:ext>
   </a:extLst>
 </a:theme>
@@ -18606,7 +18614,7 @@
   <a:extraClrSchemeLst/>
   <a:extLst>
     <a:ext uri="{05A4C25C-085E-4340-85A3-A5531E510DB2}">
-      <thm15:themeFamily xmlns:thm15="http://schemas.microsoft.com/office/thememl/2012/main" xmlns="" name="RU_Powerpoint_Sjabloon_1701_01" id="{828DFFF2-5273-C34C-ABD2-9CECC33A392B}" vid="{D9D59CB7-FFB0-994D-A0FE-D55D805C5F99}"/>
+      <thm15:themeFamily xmlns="" xmlns:thm15="http://schemas.microsoft.com/office/thememl/2012/main" name="RU_Powerpoint_Sjabloon_1701_01" id="{828DFFF2-5273-C34C-ABD2-9CECC33A392B}" vid="{D9D59CB7-FFB0-994D-A0FE-D55D805C5F99}"/>
     </a:ext>
   </a:extLst>
 </a:theme>

</xml_diff>

<commit_message>
Added results table, methods
</commit_message>
<xml_diff>
--- a/presentatie/Classified_MLiP_final_presentation_2.pptx
+++ b/presentatie/Classified_MLiP_final_presentation_2.pptx
@@ -1,6 +1,6 @@
 
 <file path=ppt/presentation.xml><?xml version="1.0" encoding="utf-8"?>
-<p:presentation xmlns:a="http://schemas.openxmlformats.org/drawingml/2006/main" xmlns:r="http://schemas.openxmlformats.org/officeDocument/2006/relationships" xmlns:p="http://schemas.openxmlformats.org/presentationml/2006/main" saveSubsetFonts="1" autoCompressPictures="0">
+<p:presentation xmlns:a="http://schemas.openxmlformats.org/drawingml/2006/main" xmlns:r="http://schemas.openxmlformats.org/officeDocument/2006/relationships" xmlns:p="http://schemas.openxmlformats.org/presentationml/2006/main" saveSubsetFonts="1" autoCompressPictures="0" bookmarkIdSeed="2">
   <p:sldMasterIdLst>
     <p:sldMasterId id="2147483731" r:id="rId1"/>
     <p:sldMasterId id="2147483721" r:id="rId2"/>
@@ -153,7 +153,7 @@
   </p:defaultTextStyle>
   <p:extLst>
     <p:ext uri="{EFAFB233-063F-42B5-8137-9DF3F51BA10A}">
-      <p15:sldGuideLst xmlns="" xmlns:p15="http://schemas.microsoft.com/office/powerpoint/2012/main">
+      <p15:sldGuideLst xmlns:p15="http://schemas.microsoft.com/office/powerpoint/2012/main" xmlns="">
         <p15:guide id="1" orient="horz" pos="3073" userDrawn="1">
           <p15:clr>
             <a:srgbClr val="A4A3A4"/>
@@ -167,7 +167,7 @@
       </p15:sldGuideLst>
     </p:ext>
     <p:ext uri="{2D200454-40CA-4A62-9FC3-DE9A4176ACB9}">
-      <p15:notesGuideLst xmlns="" xmlns:p15="http://schemas.microsoft.com/office/powerpoint/2012/main">
+      <p15:notesGuideLst xmlns:p15="http://schemas.microsoft.com/office/powerpoint/2012/main" xmlns="">
         <p15:guide id="1" orient="horz" pos="2880">
           <p15:clr>
             <a:srgbClr val="A4A3A4"/>
@@ -2681,7 +2681,7 @@
               </a14:hiddenLine>
             </a:ext>
             <a:ext uri="{FAA26D3D-D897-4be2-8F04-BA451C77F1D7}">
-              <ma14:placeholderFlag xmlns="" xmlns:ma14="http://schemas.microsoft.com/office/mac/drawingml/2011/main" val="1"/>
+              <ma14:placeholderFlag xmlns:ma14="http://schemas.microsoft.com/office/mac/drawingml/2011/main" xmlns="" val="1"/>
             </a:ext>
           </a:extLst>
         </p:spPr>
@@ -2742,7 +2742,7 @@
               </a14:hiddenLine>
             </a:ext>
             <a:ext uri="{FAA26D3D-D897-4be2-8F04-BA451C77F1D7}">
-              <ma14:placeholderFlag xmlns="" xmlns:ma14="http://schemas.microsoft.com/office/mac/drawingml/2011/main" val="1"/>
+              <ma14:placeholderFlag xmlns:ma14="http://schemas.microsoft.com/office/mac/drawingml/2011/main" xmlns="" val="1"/>
             </a:ext>
           </a:extLst>
         </p:spPr>
@@ -3421,7 +3421,7 @@
               </a14:hiddenLine>
             </a:ext>
             <a:ext uri="{FAA26D3D-D897-4be2-8F04-BA451C77F1D7}">
-              <ma14:placeholderFlag xmlns="" xmlns:ma14="http://schemas.microsoft.com/office/mac/drawingml/2011/main" val="1"/>
+              <ma14:placeholderFlag xmlns:ma14="http://schemas.microsoft.com/office/mac/drawingml/2011/main" xmlns="" val="1"/>
             </a:ext>
           </a:extLst>
         </p:spPr>
@@ -3482,7 +3482,7 @@
               </a14:hiddenLine>
             </a:ext>
             <a:ext uri="{FAA26D3D-D897-4be2-8F04-BA451C77F1D7}">
-              <ma14:placeholderFlag xmlns="" xmlns:ma14="http://schemas.microsoft.com/office/mac/drawingml/2011/main" val="1"/>
+              <ma14:placeholderFlag xmlns:ma14="http://schemas.microsoft.com/office/mac/drawingml/2011/main" xmlns="" val="1"/>
             </a:ext>
           </a:extLst>
         </p:spPr>
@@ -5086,7 +5086,7 @@
         <p:spPr/>
         <p:txBody>
           <a:bodyPr>
-            <a:normAutofit/>
+            <a:normAutofit fontScale="92500" lnSpcReduction="20000"/>
           </a:bodyPr>
           <a:lstStyle/>
           <a:p>
@@ -5189,9 +5189,10 @@
               <a:buChar char="•"/>
             </a:pPr>
             <a:r>
-              <a:rPr lang="nl-NL" dirty="0" smtClean="0"/>
-              <a:t>…</a:t>
-            </a:r>
+              <a:rPr lang="en-US" sz="2200" dirty="0" err="1" smtClean="0"/>
+              <a:t>LinearRegression</a:t>
+            </a:r>
+            <a:endParaRPr lang="en-US" sz="2200" dirty="0" smtClean="0"/>
           </a:p>
           <a:p>
             <a:pPr marL="544437" indent="-544437">
@@ -5199,10 +5200,90 @@
               <a:buChar char="•"/>
             </a:pPr>
             <a:r>
-              <a:rPr lang="nl-NL" dirty="0" err="1" smtClean="0"/>
+              <a:rPr lang="en-US" sz="2200" dirty="0" err="1" smtClean="0"/>
+              <a:t>SGDRegression</a:t>
+            </a:r>
+            <a:endParaRPr lang="en-US" sz="2200" dirty="0"/>
+          </a:p>
+          <a:p>
+            <a:pPr marL="544437" indent="-544437">
+              <a:buFont typeface="Arial" panose="020B0604020202020204" pitchFamily="34" charset="0"/>
+              <a:buChar char="•"/>
+            </a:pPr>
+            <a:r>
+              <a:rPr lang="en-US" sz="2200" dirty="0" err="1" smtClean="0"/>
+              <a:t>KNNeighbours</a:t>
+            </a:r>
+            <a:endParaRPr lang="en-US" sz="2200" dirty="0" smtClean="0"/>
+          </a:p>
+          <a:p>
+            <a:pPr marL="544437" indent="-544437">
+              <a:buFont typeface="Arial" panose="020B0604020202020204" pitchFamily="34" charset="0"/>
+              <a:buChar char="•"/>
+            </a:pPr>
+            <a:r>
+              <a:rPr lang="en-US" sz="2200" dirty="0" smtClean="0"/>
+              <a:t>Decision Tree</a:t>
+            </a:r>
+          </a:p>
+          <a:p>
+            <a:pPr marL="544437" indent="-544437">
+              <a:buFont typeface="Arial" panose="020B0604020202020204" pitchFamily="34" charset="0"/>
+              <a:buChar char="•"/>
+            </a:pPr>
+            <a:r>
+              <a:rPr lang="en-US" sz="2200" dirty="0" err="1" smtClean="0"/>
+              <a:t>RandomForests</a:t>
+            </a:r>
+            <a:endParaRPr lang="en-US" sz="2200" dirty="0"/>
+          </a:p>
+          <a:p>
+            <a:pPr marL="544437" indent="-544437">
+              <a:buFont typeface="Arial" panose="020B0604020202020204" pitchFamily="34" charset="0"/>
+              <a:buChar char="•"/>
+            </a:pPr>
+            <a:r>
+              <a:rPr lang="en-US" sz="2200" dirty="0" err="1" smtClean="0"/>
+              <a:t>Gradientboosting</a:t>
+            </a:r>
+            <a:r>
+              <a:rPr lang="en-US" sz="2200" dirty="0" smtClean="0"/>
+              <a:t> </a:t>
+            </a:r>
+            <a:r>
+              <a:rPr lang="en-US" sz="2200" dirty="0" err="1" smtClean="0"/>
+              <a:t>Regressor</a:t>
+            </a:r>
+            <a:endParaRPr lang="en-US" sz="2200" dirty="0" smtClean="0"/>
+          </a:p>
+          <a:p>
+            <a:pPr marL="544437" indent="-544437">
+              <a:buFont typeface="Arial" panose="020B0604020202020204" pitchFamily="34" charset="0"/>
+              <a:buChar char="•"/>
+            </a:pPr>
+            <a:r>
+              <a:rPr lang="en-US" sz="2200" dirty="0" smtClean="0"/>
+              <a:t>Deep Learning (</a:t>
+            </a:r>
+            <a:r>
+              <a:rPr lang="en-US" sz="2200" dirty="0" err="1" smtClean="0"/>
+              <a:t>Keras</a:t>
+            </a:r>
+            <a:r>
+              <a:rPr lang="en-US" sz="2200" dirty="0" smtClean="0"/>
+              <a:t>)</a:t>
+            </a:r>
+          </a:p>
+          <a:p>
+            <a:pPr marL="544437" indent="-544437">
+              <a:buFont typeface="Arial" panose="020B0604020202020204" pitchFamily="34" charset="0"/>
+              <a:buChar char="•"/>
+            </a:pPr>
+            <a:r>
+              <a:rPr lang="nl-NL" u="sng" dirty="0" err="1" smtClean="0"/>
               <a:t>XGBoost</a:t>
             </a:r>
-            <a:endParaRPr lang="nl-NL" dirty="0" smtClean="0"/>
+            <a:endParaRPr lang="nl-NL" u="sng" dirty="0" smtClean="0"/>
           </a:p>
           <a:p>
             <a:pPr marL="544437" indent="-544437">
@@ -8579,53 +8660,22 @@
           <a:bodyPr/>
           <a:lstStyle/>
           <a:p>
-            <a:r>
-              <a:rPr lang="nl-NL" dirty="0" err="1" smtClean="0"/>
-              <a:t>Something</a:t>
-            </a:r>
-            <a:r>
-              <a:rPr lang="nl-NL" dirty="0" smtClean="0"/>
-              <a:t> </a:t>
-            </a:r>
-            <a:r>
-              <a:rPr lang="nl-NL" dirty="0" err="1" smtClean="0"/>
-              <a:t>something</a:t>
-            </a:r>
-            <a:r>
-              <a:rPr lang="nl-NL" dirty="0" smtClean="0"/>
-              <a:t> </a:t>
-            </a:r>
-            <a:r>
-              <a:rPr lang="nl-NL" dirty="0" err="1" smtClean="0"/>
-              <a:t>XGBoost</a:t>
-            </a:r>
             <a:endParaRPr lang="nl-NL" dirty="0"/>
           </a:p>
         </p:txBody>
       </p:sp>
-      <p:pic>
-        <p:nvPicPr>
-          <p:cNvPr id="5" name="Picture 5"/>
-          <p:cNvPicPr/>
+      <p:sp>
+        <p:nvSpPr>
+          <p:cNvPr id="10" name="Rectangle 4"/>
+          <p:cNvSpPr>
+            <a:spLocks noChangeArrowheads="1"/>
+          </p:cNvSpPr>
           <p:nvPr/>
-        </p:nvPicPr>
-        <p:blipFill>
-          <a:blip r:embed="rId2" cstate="print">
-            <a:extLst>
-              <a:ext uri="{28A0092B-C50C-407E-A947-70E740481C1C}">
-                <a14:useLocalDpi xmlns:a14="http://schemas.microsoft.com/office/drawing/2010/main" val="0"/>
-              </a:ext>
-            </a:extLst>
-          </a:blip>
-          <a:srcRect/>
-          <a:stretch>
-            <a:fillRect/>
-          </a:stretch>
-        </p:blipFill>
+        </p:nvSpPr>
         <p:spPr bwMode="auto">
           <a:xfrm>
-            <a:off x="4357871" y="3534092"/>
-            <a:ext cx="8632458" cy="4695507"/>
+            <a:off x="5929313" y="3679825"/>
+            <a:ext cx="17348200" cy="0"/>
           </a:xfrm>
           <a:prstGeom prst="rect">
             <a:avLst/>
@@ -8634,8 +8684,1919 @@
           <a:ln>
             <a:noFill/>
           </a:ln>
+          <a:effectLst/>
+          <a:extLst>
+            <a:ext uri="{909E8E84-426E-40DD-AFC4-6F175D3DCCD1}">
+              <a14:hiddenFill xmlns:a14="http://schemas.microsoft.com/office/drawing/2010/main">
+                <a:solidFill>
+                  <a:schemeClr val="accent1"/>
+                </a:solidFill>
+              </a14:hiddenFill>
+            </a:ext>
+            <a:ext uri="{91240B29-F687-4F45-9708-019B960494DF}">
+              <a14:hiddenLine xmlns:a14="http://schemas.microsoft.com/office/drawing/2010/main" w="9525">
+                <a:solidFill>
+                  <a:schemeClr val="tx1"/>
+                </a:solidFill>
+                <a:miter lim="800000"/>
+                <a:headEnd/>
+                <a:tailEnd/>
+              </a14:hiddenLine>
+            </a:ext>
+            <a:ext uri="{AF507438-7753-43E0-B8FC-AC1667EBCBE1}">
+              <a14:hiddenEffects xmlns:a14="http://schemas.microsoft.com/office/drawing/2010/main">
+                <a:effectLst>
+                  <a:outerShdw dist="35921" dir="2700000" algn="ctr" rotWithShape="0">
+                    <a:schemeClr val="bg2"/>
+                  </a:outerShdw>
+                </a:effectLst>
+              </a14:hiddenEffects>
+            </a:ext>
+          </a:extLst>
         </p:spPr>
-      </p:pic>
+        <p:txBody>
+          <a:bodyPr vert="horz" wrap="none" lIns="91440" tIns="45720" rIns="91440" bIns="45720" numCol="1" anchor="ctr" anchorCtr="0" compatLnSpc="1">
+            <a:prstTxWarp prst="textNoShape">
+              <a:avLst/>
+            </a:prstTxWarp>
+            <a:spAutoFit/>
+          </a:bodyPr>
+          <a:lstStyle/>
+          <a:p>
+            <a:pPr marL="0" marR="0" lvl="0" indent="0" algn="l" defTabSz="914400" rtl="0" eaLnBrk="1" fontAlgn="base" latinLnBrk="0" hangingPunct="1">
+              <a:lnSpc>
+                <a:spcPct val="100000"/>
+              </a:lnSpc>
+              <a:spcBef>
+                <a:spcPct val="0"/>
+              </a:spcBef>
+              <a:spcAft>
+                <a:spcPct val="0"/>
+              </a:spcAft>
+              <a:buClrTx/>
+              <a:buSzTx/>
+              <a:buFontTx/>
+              <a:buNone/>
+              <a:tabLst/>
+            </a:pPr>
+            <a:r>
+              <a:rPr kumimoji="0" lang="nl-NL" altLang="nl-NL" sz="1800" b="0" i="0" u="none" strike="noStrike" cap="none" normalizeH="0" baseline="0" smtClean="0">
+                <a:ln>
+                  <a:noFill/>
+                </a:ln>
+                <a:solidFill>
+                  <a:schemeClr val="tx1"/>
+                </a:solidFill>
+                <a:effectLst/>
+                <a:latin typeface="Arial" pitchFamily="34" charset="0"/>
+                <a:cs typeface="Arial" pitchFamily="34" charset="0"/>
+              </a:rPr>
+              <a:t/>
+            </a:r>
+            <a:br>
+              <a:rPr kumimoji="0" lang="nl-NL" altLang="nl-NL" sz="1800" b="0" i="0" u="none" strike="noStrike" cap="none" normalizeH="0" baseline="0" smtClean="0">
+                <a:ln>
+                  <a:noFill/>
+                </a:ln>
+                <a:solidFill>
+                  <a:schemeClr val="tx1"/>
+                </a:solidFill>
+                <a:effectLst/>
+                <a:latin typeface="Arial" pitchFamily="34" charset="0"/>
+                <a:cs typeface="Arial" pitchFamily="34" charset="0"/>
+              </a:rPr>
+            </a:br>
+            <a:endParaRPr kumimoji="0" lang="nl-NL" altLang="nl-NL" sz="1800" b="0" i="0" u="none" strike="noStrike" cap="none" normalizeH="0" baseline="0" smtClean="0">
+              <a:ln>
+                <a:noFill/>
+              </a:ln>
+              <a:solidFill>
+                <a:schemeClr val="tx1"/>
+              </a:solidFill>
+              <a:effectLst/>
+              <a:latin typeface="Arial" pitchFamily="34" charset="0"/>
+              <a:cs typeface="Arial" pitchFamily="34" charset="0"/>
+            </a:endParaRPr>
+          </a:p>
+        </p:txBody>
+      </p:sp>
+      <p:graphicFrame>
+        <p:nvGraphicFramePr>
+          <p:cNvPr id="17" name="Tabel 16"/>
+          <p:cNvGraphicFramePr>
+            <a:graphicFrameLocks noGrp="1"/>
+          </p:cNvGraphicFramePr>
+          <p:nvPr>
+            <p:extLst>
+              <p:ext uri="{D42A27DB-BD31-4B8C-83A1-F6EECF244321}">
+                <p14:modId xmlns:p14="http://schemas.microsoft.com/office/powerpoint/2010/main" val="4098078252"/>
+              </p:ext>
+            </p:extLst>
+          </p:nvPr>
+        </p:nvGraphicFramePr>
+        <p:xfrm>
+          <a:off x="3723879" y="1581633"/>
+          <a:ext cx="9900443" cy="6593509"/>
+        </p:xfrm>
+        <a:graphic>
+          <a:graphicData uri="http://schemas.openxmlformats.org/drawingml/2006/table">
+            <a:tbl>
+              <a:tblPr firstRow="1" firstCol="1" bandRow="1">
+                <a:tableStyleId>{5C22544A-7EE6-4342-B048-85BDC9FD1C3A}</a:tableStyleId>
+              </a:tblPr>
+              <a:tblGrid>
+                <a:gridCol w="3273917"/>
+                <a:gridCol w="3160503"/>
+                <a:gridCol w="1325074"/>
+                <a:gridCol w="2140949"/>
+              </a:tblGrid>
+              <a:tr h="584344">
+                <a:tc>
+                  <a:txBody>
+                    <a:bodyPr/>
+                    <a:lstStyle/>
+                    <a:p>
+                      <a:pPr>
+                        <a:lnSpc>
+                          <a:spcPct val="107000"/>
+                        </a:lnSpc>
+                        <a:spcAft>
+                          <a:spcPts val="0"/>
+                        </a:spcAft>
+                      </a:pPr>
+                      <a:r>
+                        <a:rPr lang="en-US" sz="1800" dirty="0">
+                          <a:effectLst/>
+                        </a:rPr>
+                        <a:t>Classifier</a:t>
+                      </a:r>
+                      <a:endParaRPr lang="nl-NL" sz="1800" dirty="0">
+                        <a:effectLst/>
+                        <a:latin typeface="Calibri"/>
+                        <a:ea typeface="Calibri"/>
+                        <a:cs typeface="Times New Roman"/>
+                      </a:endParaRPr>
+                    </a:p>
+                  </a:txBody>
+                  <a:tcPr marL="68580" marR="68580" marT="0" marB="0"/>
+                </a:tc>
+                <a:tc>
+                  <a:txBody>
+                    <a:bodyPr/>
+                    <a:lstStyle/>
+                    <a:p>
+                      <a:pPr>
+                        <a:lnSpc>
+                          <a:spcPct val="107000"/>
+                        </a:lnSpc>
+                        <a:spcAft>
+                          <a:spcPts val="0"/>
+                        </a:spcAft>
+                      </a:pPr>
+                      <a:r>
+                        <a:rPr lang="en-US" sz="1800">
+                          <a:effectLst/>
+                        </a:rPr>
+                        <a:t>Method</a:t>
+                      </a:r>
+                      <a:endParaRPr lang="nl-NL" sz="1800">
+                        <a:effectLst/>
+                        <a:latin typeface="Calibri"/>
+                        <a:ea typeface="Calibri"/>
+                        <a:cs typeface="Times New Roman"/>
+                      </a:endParaRPr>
+                    </a:p>
+                  </a:txBody>
+                  <a:tcPr marL="68580" marR="68580" marT="0" marB="0"/>
+                </a:tc>
+                <a:tc>
+                  <a:txBody>
+                    <a:bodyPr/>
+                    <a:lstStyle/>
+                    <a:p>
+                      <a:pPr>
+                        <a:lnSpc>
+                          <a:spcPct val="107000"/>
+                        </a:lnSpc>
+                        <a:spcAft>
+                          <a:spcPts val="0"/>
+                        </a:spcAft>
+                      </a:pPr>
+                      <a:r>
+                        <a:rPr lang="en-US" sz="1800">
+                          <a:effectLst/>
+                        </a:rPr>
+                        <a:t>RMSLE </a:t>
+                      </a:r>
+                      <a:endParaRPr lang="nl-NL" sz="1800">
+                        <a:effectLst/>
+                        <a:latin typeface="Calibri"/>
+                        <a:ea typeface="Calibri"/>
+                        <a:cs typeface="Times New Roman"/>
+                      </a:endParaRPr>
+                    </a:p>
+                  </a:txBody>
+                  <a:tcPr marL="68580" marR="68580" marT="0" marB="0"/>
+                </a:tc>
+                <a:tc>
+                  <a:txBody>
+                    <a:bodyPr/>
+                    <a:lstStyle/>
+                    <a:p>
+                      <a:pPr>
+                        <a:lnSpc>
+                          <a:spcPct val="107000"/>
+                        </a:lnSpc>
+                        <a:spcAft>
+                          <a:spcPts val="0"/>
+                        </a:spcAft>
+                      </a:pPr>
+                      <a:r>
+                        <a:rPr lang="en-US" sz="1800">
+                          <a:effectLst/>
+                        </a:rPr>
+                        <a:t>Kaggle Rank (3077)</a:t>
+                      </a:r>
+                      <a:endParaRPr lang="nl-NL" sz="1800">
+                        <a:effectLst/>
+                        <a:latin typeface="Calibri"/>
+                        <a:ea typeface="Calibri"/>
+                        <a:cs typeface="Times New Roman"/>
+                      </a:endParaRPr>
+                    </a:p>
+                  </a:txBody>
+                  <a:tcPr marL="68580" marR="68580" marT="0" marB="0"/>
+                </a:tc>
+              </a:tr>
+              <a:tr h="296667">
+                <a:tc>
+                  <a:txBody>
+                    <a:bodyPr/>
+                    <a:lstStyle/>
+                    <a:p>
+                      <a:pPr>
+                        <a:lnSpc>
+                          <a:spcPct val="107000"/>
+                        </a:lnSpc>
+                        <a:spcAft>
+                          <a:spcPts val="0"/>
+                        </a:spcAft>
+                      </a:pPr>
+                      <a:r>
+                        <a:rPr lang="en-US" sz="1800">
+                          <a:effectLst/>
+                        </a:rPr>
+                        <a:t>Benchmark Submission</a:t>
+                      </a:r>
+                      <a:endParaRPr lang="nl-NL" sz="1800">
+                        <a:effectLst/>
+                        <a:latin typeface="Calibri"/>
+                        <a:ea typeface="Calibri"/>
+                        <a:cs typeface="Times New Roman"/>
+                      </a:endParaRPr>
+                    </a:p>
+                  </a:txBody>
+                  <a:tcPr marL="68580" marR="68580" marT="0" marB="0"/>
+                </a:tc>
+                <a:tc>
+                  <a:txBody>
+                    <a:bodyPr/>
+                    <a:lstStyle/>
+                    <a:p>
+                      <a:pPr>
+                        <a:lnSpc>
+                          <a:spcPct val="107000"/>
+                        </a:lnSpc>
+                        <a:spcAft>
+                          <a:spcPts val="0"/>
+                        </a:spcAft>
+                      </a:pPr>
+                      <a:r>
+                        <a:rPr lang="en-US" sz="1800">
+                          <a:effectLst/>
+                        </a:rPr>
+                        <a:t>Naïve XGBoost</a:t>
+                      </a:r>
+                      <a:endParaRPr lang="nl-NL" sz="1800">
+                        <a:effectLst/>
+                        <a:latin typeface="Calibri"/>
+                        <a:ea typeface="Calibri"/>
+                        <a:cs typeface="Times New Roman"/>
+                      </a:endParaRPr>
+                    </a:p>
+                  </a:txBody>
+                  <a:tcPr marL="68580" marR="68580" marT="0" marB="0"/>
+                </a:tc>
+                <a:tc>
+                  <a:txBody>
+                    <a:bodyPr/>
+                    <a:lstStyle/>
+                    <a:p>
+                      <a:pPr>
+                        <a:lnSpc>
+                          <a:spcPct val="107000"/>
+                        </a:lnSpc>
+                        <a:spcAft>
+                          <a:spcPts val="0"/>
+                        </a:spcAft>
+                      </a:pPr>
+                      <a:r>
+                        <a:rPr lang="en-US" sz="1800">
+                          <a:effectLst/>
+                        </a:rPr>
+                        <a:t>0.67333</a:t>
+                      </a:r>
+                      <a:endParaRPr lang="nl-NL" sz="1800">
+                        <a:effectLst/>
+                        <a:latin typeface="Calibri"/>
+                        <a:ea typeface="Calibri"/>
+                        <a:cs typeface="Times New Roman"/>
+                      </a:endParaRPr>
+                    </a:p>
+                  </a:txBody>
+                  <a:tcPr marL="68580" marR="68580" marT="0" marB="0"/>
+                </a:tc>
+                <a:tc>
+                  <a:txBody>
+                    <a:bodyPr/>
+                    <a:lstStyle/>
+                    <a:p>
+                      <a:pPr>
+                        <a:lnSpc>
+                          <a:spcPct val="107000"/>
+                        </a:lnSpc>
+                        <a:spcAft>
+                          <a:spcPts val="0"/>
+                        </a:spcAft>
+                      </a:pPr>
+                      <a:r>
+                        <a:rPr lang="en-US" sz="1800">
+                          <a:effectLst/>
+                        </a:rPr>
+                        <a:t>3034</a:t>
+                      </a:r>
+                      <a:endParaRPr lang="nl-NL" sz="1800">
+                        <a:effectLst/>
+                        <a:latin typeface="Calibri"/>
+                        <a:ea typeface="Calibri"/>
+                        <a:cs typeface="Times New Roman"/>
+                      </a:endParaRPr>
+                    </a:p>
+                  </a:txBody>
+                  <a:tcPr marL="68580" marR="68580" marT="0" marB="0"/>
+                </a:tc>
+              </a:tr>
+              <a:tr h="296667">
+                <a:tc>
+                  <a:txBody>
+                    <a:bodyPr/>
+                    <a:lstStyle/>
+                    <a:p>
+                      <a:pPr>
+                        <a:lnSpc>
+                          <a:spcPct val="107000"/>
+                        </a:lnSpc>
+                        <a:spcAft>
+                          <a:spcPts val="0"/>
+                        </a:spcAft>
+                      </a:pPr>
+                      <a:r>
+                        <a:rPr lang="en-US" sz="1800">
+                          <a:effectLst/>
+                        </a:rPr>
+                        <a:t>XGBoost</a:t>
+                      </a:r>
+                      <a:endParaRPr lang="nl-NL" sz="1800">
+                        <a:effectLst/>
+                        <a:latin typeface="Calibri"/>
+                        <a:ea typeface="Calibri"/>
+                        <a:cs typeface="Times New Roman"/>
+                      </a:endParaRPr>
+                    </a:p>
+                  </a:txBody>
+                  <a:tcPr marL="68580" marR="68580" marT="0" marB="0"/>
+                </a:tc>
+                <a:tc>
+                  <a:txBody>
+                    <a:bodyPr/>
+                    <a:lstStyle/>
+                    <a:p>
+                      <a:pPr>
+                        <a:lnSpc>
+                          <a:spcPct val="107000"/>
+                        </a:lnSpc>
+                        <a:spcAft>
+                          <a:spcPts val="0"/>
+                        </a:spcAft>
+                      </a:pPr>
+                      <a:r>
+                        <a:rPr lang="en-US" sz="1800">
+                          <a:effectLst/>
+                        </a:rPr>
+                        <a:t>Single</a:t>
+                      </a:r>
+                      <a:endParaRPr lang="nl-NL" sz="1800">
+                        <a:effectLst/>
+                        <a:latin typeface="Calibri"/>
+                        <a:ea typeface="Calibri"/>
+                        <a:cs typeface="Times New Roman"/>
+                      </a:endParaRPr>
+                    </a:p>
+                  </a:txBody>
+                  <a:tcPr marL="68580" marR="68580" marT="0" marB="0"/>
+                </a:tc>
+                <a:tc>
+                  <a:txBody>
+                    <a:bodyPr/>
+                    <a:lstStyle/>
+                    <a:p>
+                      <a:pPr>
+                        <a:lnSpc>
+                          <a:spcPct val="107000"/>
+                        </a:lnSpc>
+                        <a:spcAft>
+                          <a:spcPts val="0"/>
+                        </a:spcAft>
+                      </a:pPr>
+                      <a:r>
+                        <a:rPr lang="en-US" sz="1800">
+                          <a:effectLst/>
+                        </a:rPr>
+                        <a:t>0.32575</a:t>
+                      </a:r>
+                      <a:endParaRPr lang="nl-NL" sz="1800">
+                        <a:effectLst/>
+                        <a:latin typeface="Calibri"/>
+                        <a:ea typeface="Calibri"/>
+                        <a:cs typeface="Times New Roman"/>
+                      </a:endParaRPr>
+                    </a:p>
+                  </a:txBody>
+                  <a:tcPr marL="68580" marR="68580" marT="0" marB="0"/>
+                </a:tc>
+                <a:tc>
+                  <a:txBody>
+                    <a:bodyPr/>
+                    <a:lstStyle/>
+                    <a:p>
+                      <a:pPr>
+                        <a:lnSpc>
+                          <a:spcPct val="107000"/>
+                        </a:lnSpc>
+                        <a:spcAft>
+                          <a:spcPts val="0"/>
+                        </a:spcAft>
+                      </a:pPr>
+                      <a:r>
+                        <a:rPr lang="en-US" sz="1800" dirty="0">
+                          <a:effectLst/>
+                        </a:rPr>
+                        <a:t>1856</a:t>
+                      </a:r>
+                      <a:endParaRPr lang="nl-NL" sz="1800" dirty="0">
+                        <a:effectLst/>
+                        <a:latin typeface="Calibri"/>
+                        <a:ea typeface="Calibri"/>
+                        <a:cs typeface="Times New Roman"/>
+                      </a:endParaRPr>
+                    </a:p>
+                  </a:txBody>
+                  <a:tcPr marL="68580" marR="68580" marT="0" marB="0"/>
+                </a:tc>
+              </a:tr>
+              <a:tr h="296667">
+                <a:tc>
+                  <a:txBody>
+                    <a:bodyPr/>
+                    <a:lstStyle/>
+                    <a:p>
+                      <a:pPr>
+                        <a:lnSpc>
+                          <a:spcPct val="107000"/>
+                        </a:lnSpc>
+                        <a:spcAft>
+                          <a:spcPts val="0"/>
+                        </a:spcAft>
+                      </a:pPr>
+                      <a:r>
+                        <a:rPr lang="en-US" sz="1800">
+                          <a:effectLst/>
+                        </a:rPr>
+                        <a:t>XGBoost</a:t>
+                      </a:r>
+                      <a:endParaRPr lang="nl-NL" sz="1800">
+                        <a:effectLst/>
+                        <a:latin typeface="Calibri"/>
+                        <a:ea typeface="Calibri"/>
+                        <a:cs typeface="Times New Roman"/>
+                      </a:endParaRPr>
+                    </a:p>
+                  </a:txBody>
+                  <a:tcPr marL="68580" marR="68580" marT="0" marB="0"/>
+                </a:tc>
+                <a:tc>
+                  <a:txBody>
+                    <a:bodyPr/>
+                    <a:lstStyle/>
+                    <a:p>
+                      <a:pPr>
+                        <a:lnSpc>
+                          <a:spcPct val="107000"/>
+                        </a:lnSpc>
+                        <a:spcAft>
+                          <a:spcPts val="0"/>
+                        </a:spcAft>
+                      </a:pPr>
+                      <a:r>
+                        <a:rPr lang="en-US" sz="1800">
+                          <a:effectLst/>
+                        </a:rPr>
+                        <a:t>Ensemble with 3 models</a:t>
+                      </a:r>
+                      <a:endParaRPr lang="nl-NL" sz="1800">
+                        <a:effectLst/>
+                        <a:latin typeface="Calibri"/>
+                        <a:ea typeface="Calibri"/>
+                        <a:cs typeface="Times New Roman"/>
+                      </a:endParaRPr>
+                    </a:p>
+                  </a:txBody>
+                  <a:tcPr marL="68580" marR="68580" marT="0" marB="0"/>
+                </a:tc>
+                <a:tc>
+                  <a:txBody>
+                    <a:bodyPr/>
+                    <a:lstStyle/>
+                    <a:p>
+                      <a:pPr>
+                        <a:lnSpc>
+                          <a:spcPct val="107000"/>
+                        </a:lnSpc>
+                        <a:spcAft>
+                          <a:spcPts val="0"/>
+                        </a:spcAft>
+                      </a:pPr>
+                      <a:r>
+                        <a:rPr lang="en-US" sz="1800">
+                          <a:effectLst/>
+                        </a:rPr>
+                        <a:t>0.31062</a:t>
+                      </a:r>
+                      <a:endParaRPr lang="nl-NL" sz="1800">
+                        <a:effectLst/>
+                        <a:latin typeface="Calibri"/>
+                        <a:ea typeface="Calibri"/>
+                        <a:cs typeface="Times New Roman"/>
+                      </a:endParaRPr>
+                    </a:p>
+                  </a:txBody>
+                  <a:tcPr marL="68580" marR="68580" marT="0" marB="0"/>
+                </a:tc>
+                <a:tc>
+                  <a:txBody>
+                    <a:bodyPr/>
+                    <a:lstStyle/>
+                    <a:p>
+                      <a:pPr>
+                        <a:lnSpc>
+                          <a:spcPct val="107000"/>
+                        </a:lnSpc>
+                        <a:spcAft>
+                          <a:spcPts val="0"/>
+                        </a:spcAft>
+                      </a:pPr>
+                      <a:r>
+                        <a:rPr lang="en-US" sz="1800">
+                          <a:effectLst/>
+                        </a:rPr>
+                        <a:t>266</a:t>
+                      </a:r>
+                      <a:endParaRPr lang="nl-NL" sz="1800">
+                        <a:effectLst/>
+                        <a:latin typeface="Calibri"/>
+                        <a:ea typeface="Calibri"/>
+                        <a:cs typeface="Times New Roman"/>
+                      </a:endParaRPr>
+                    </a:p>
+                  </a:txBody>
+                  <a:tcPr marL="68580" marR="68580" marT="0" marB="0"/>
+                </a:tc>
+              </a:tr>
+              <a:tr h="883141">
+                <a:tc>
+                  <a:txBody>
+                    <a:bodyPr/>
+                    <a:lstStyle/>
+                    <a:p>
+                      <a:pPr>
+                        <a:lnSpc>
+                          <a:spcPct val="107000"/>
+                        </a:lnSpc>
+                        <a:spcAft>
+                          <a:spcPts val="0"/>
+                        </a:spcAft>
+                      </a:pPr>
+                      <a:r>
+                        <a:rPr lang="en-US" sz="1800">
+                          <a:effectLst/>
+                        </a:rPr>
+                        <a:t>XGBoost</a:t>
+                      </a:r>
+                      <a:endParaRPr lang="nl-NL" sz="1800">
+                        <a:effectLst/>
+                        <a:latin typeface="Calibri"/>
+                        <a:ea typeface="Calibri"/>
+                        <a:cs typeface="Times New Roman"/>
+                      </a:endParaRPr>
+                    </a:p>
+                  </a:txBody>
+                  <a:tcPr marL="68580" marR="68580" marT="0" marB="0"/>
+                </a:tc>
+                <a:tc>
+                  <a:txBody>
+                    <a:bodyPr/>
+                    <a:lstStyle/>
+                    <a:p>
+                      <a:pPr>
+                        <a:lnSpc>
+                          <a:spcPct val="107000"/>
+                        </a:lnSpc>
+                        <a:spcAft>
+                          <a:spcPts val="0"/>
+                        </a:spcAft>
+                      </a:pPr>
+                      <a:r>
+                        <a:rPr lang="en-US" sz="1800">
+                          <a:effectLst/>
+                        </a:rPr>
+                        <a:t>Ensemble with 3 models</a:t>
+                      </a:r>
+                      <a:endParaRPr lang="nl-NL" sz="1800">
+                        <a:effectLst/>
+                      </a:endParaRPr>
+                    </a:p>
+                    <a:p>
+                      <a:pPr>
+                        <a:lnSpc>
+                          <a:spcPct val="107000"/>
+                        </a:lnSpc>
+                        <a:spcAft>
+                          <a:spcPts val="0"/>
+                        </a:spcAft>
+                      </a:pPr>
+                      <a:r>
+                        <a:rPr lang="en-US" sz="1800">
+                          <a:effectLst/>
+                        </a:rPr>
+                        <a:t>Readjustment of submission</a:t>
+                      </a:r>
+                      <a:endParaRPr lang="nl-NL" sz="1800">
+                        <a:effectLst/>
+                        <a:latin typeface="Calibri"/>
+                        <a:ea typeface="Calibri"/>
+                        <a:cs typeface="Times New Roman"/>
+                      </a:endParaRPr>
+                    </a:p>
+                  </a:txBody>
+                  <a:tcPr marL="68580" marR="68580" marT="0" marB="0"/>
+                </a:tc>
+                <a:tc>
+                  <a:txBody>
+                    <a:bodyPr/>
+                    <a:lstStyle/>
+                    <a:p>
+                      <a:pPr>
+                        <a:lnSpc>
+                          <a:spcPct val="107000"/>
+                        </a:lnSpc>
+                        <a:spcAft>
+                          <a:spcPts val="0"/>
+                        </a:spcAft>
+                      </a:pPr>
+                      <a:r>
+                        <a:rPr lang="en-US" sz="1800">
+                          <a:effectLst/>
+                        </a:rPr>
+                        <a:t>0.31051</a:t>
+                      </a:r>
+                      <a:endParaRPr lang="nl-NL" sz="1800">
+                        <a:effectLst/>
+                        <a:latin typeface="Calibri"/>
+                        <a:ea typeface="Calibri"/>
+                        <a:cs typeface="Times New Roman"/>
+                      </a:endParaRPr>
+                    </a:p>
+                  </a:txBody>
+                  <a:tcPr marL="68580" marR="68580" marT="0" marB="0"/>
+                </a:tc>
+                <a:tc>
+                  <a:txBody>
+                    <a:bodyPr/>
+                    <a:lstStyle/>
+                    <a:p>
+                      <a:pPr>
+                        <a:lnSpc>
+                          <a:spcPct val="107000"/>
+                        </a:lnSpc>
+                        <a:spcAft>
+                          <a:spcPts val="0"/>
+                        </a:spcAft>
+                      </a:pPr>
+                      <a:r>
+                        <a:rPr lang="en-US" sz="1800">
+                          <a:effectLst/>
+                        </a:rPr>
+                        <a:t>168</a:t>
+                      </a:r>
+                      <a:endParaRPr lang="nl-NL" sz="1800">
+                        <a:effectLst/>
+                        <a:latin typeface="Calibri"/>
+                        <a:ea typeface="Calibri"/>
+                        <a:cs typeface="Times New Roman"/>
+                      </a:endParaRPr>
+                    </a:p>
+                  </a:txBody>
+                  <a:tcPr marL="68580" marR="68580" marT="0" marB="0"/>
+                </a:tc>
+              </a:tr>
+              <a:tr h="296667">
+                <a:tc>
+                  <a:txBody>
+                    <a:bodyPr/>
+                    <a:lstStyle/>
+                    <a:p>
+                      <a:pPr>
+                        <a:lnSpc>
+                          <a:spcPct val="107000"/>
+                        </a:lnSpc>
+                        <a:spcAft>
+                          <a:spcPts val="0"/>
+                        </a:spcAft>
+                      </a:pPr>
+                      <a:r>
+                        <a:rPr lang="en-US" sz="1800">
+                          <a:effectLst/>
+                        </a:rPr>
+                        <a:t>Deep Learning</a:t>
+                      </a:r>
+                      <a:endParaRPr lang="nl-NL" sz="1800">
+                        <a:effectLst/>
+                        <a:latin typeface="Calibri"/>
+                        <a:ea typeface="Calibri"/>
+                        <a:cs typeface="Times New Roman"/>
+                      </a:endParaRPr>
+                    </a:p>
+                  </a:txBody>
+                  <a:tcPr marL="68580" marR="68580" marT="0" marB="0"/>
+                </a:tc>
+                <a:tc>
+                  <a:txBody>
+                    <a:bodyPr/>
+                    <a:lstStyle/>
+                    <a:p>
+                      <a:pPr>
+                        <a:lnSpc>
+                          <a:spcPct val="107000"/>
+                        </a:lnSpc>
+                        <a:spcAft>
+                          <a:spcPts val="0"/>
+                        </a:spcAft>
+                      </a:pPr>
+                      <a:r>
+                        <a:rPr lang="en-US" sz="1800">
+                          <a:effectLst/>
+                        </a:rPr>
+                        <a:t>Dense and Dropout</a:t>
+                      </a:r>
+                      <a:endParaRPr lang="nl-NL" sz="1800">
+                        <a:effectLst/>
+                        <a:latin typeface="Calibri"/>
+                        <a:ea typeface="Calibri"/>
+                        <a:cs typeface="Times New Roman"/>
+                      </a:endParaRPr>
+                    </a:p>
+                  </a:txBody>
+                  <a:tcPr marL="68580" marR="68580" marT="0" marB="0"/>
+                </a:tc>
+                <a:tc>
+                  <a:txBody>
+                    <a:bodyPr/>
+                    <a:lstStyle/>
+                    <a:p>
+                      <a:pPr>
+                        <a:lnSpc>
+                          <a:spcPct val="107000"/>
+                        </a:lnSpc>
+                        <a:spcAft>
+                          <a:spcPts val="0"/>
+                        </a:spcAft>
+                      </a:pPr>
+                      <a:r>
+                        <a:rPr lang="en-US" sz="1800">
+                          <a:effectLst/>
+                        </a:rPr>
+                        <a:t>0.46745</a:t>
+                      </a:r>
+                      <a:endParaRPr lang="nl-NL" sz="1800">
+                        <a:effectLst/>
+                        <a:latin typeface="Calibri"/>
+                        <a:ea typeface="Calibri"/>
+                        <a:cs typeface="Times New Roman"/>
+                      </a:endParaRPr>
+                    </a:p>
+                  </a:txBody>
+                  <a:tcPr marL="68580" marR="68580" marT="0" marB="0"/>
+                </a:tc>
+                <a:tc>
+                  <a:txBody>
+                    <a:bodyPr/>
+                    <a:lstStyle/>
+                    <a:p>
+                      <a:pPr>
+                        <a:lnSpc>
+                          <a:spcPct val="107000"/>
+                        </a:lnSpc>
+                        <a:spcAft>
+                          <a:spcPts val="0"/>
+                        </a:spcAft>
+                      </a:pPr>
+                      <a:r>
+                        <a:rPr lang="en-US" sz="1800">
+                          <a:effectLst/>
+                        </a:rPr>
+                        <a:t>2870</a:t>
+                      </a:r>
+                      <a:endParaRPr lang="nl-NL" sz="1800">
+                        <a:effectLst/>
+                        <a:latin typeface="Calibri"/>
+                        <a:ea typeface="Calibri"/>
+                        <a:cs typeface="Times New Roman"/>
+                      </a:endParaRPr>
+                    </a:p>
+                  </a:txBody>
+                  <a:tcPr marL="68580" marR="68580" marT="0" marB="0"/>
+                </a:tc>
+              </a:tr>
+              <a:tr h="296667">
+                <a:tc>
+                  <a:txBody>
+                    <a:bodyPr/>
+                    <a:lstStyle/>
+                    <a:p>
+                      <a:pPr>
+                        <a:lnSpc>
+                          <a:spcPct val="107000"/>
+                        </a:lnSpc>
+                        <a:spcAft>
+                          <a:spcPts val="0"/>
+                        </a:spcAft>
+                      </a:pPr>
+                      <a:r>
+                        <a:rPr lang="en-US" sz="1800">
+                          <a:effectLst/>
+                        </a:rPr>
+                        <a:t>Random Forest</a:t>
+                      </a:r>
+                      <a:endParaRPr lang="nl-NL" sz="1800">
+                        <a:effectLst/>
+                        <a:latin typeface="Calibri"/>
+                        <a:ea typeface="Calibri"/>
+                        <a:cs typeface="Times New Roman"/>
+                      </a:endParaRPr>
+                    </a:p>
+                  </a:txBody>
+                  <a:tcPr marL="68580" marR="68580" marT="0" marB="0"/>
+                </a:tc>
+                <a:tc>
+                  <a:txBody>
+                    <a:bodyPr/>
+                    <a:lstStyle/>
+                    <a:p>
+                      <a:pPr>
+                        <a:lnSpc>
+                          <a:spcPct val="107000"/>
+                        </a:lnSpc>
+                        <a:spcAft>
+                          <a:spcPts val="0"/>
+                        </a:spcAft>
+                      </a:pPr>
+                      <a:r>
+                        <a:rPr lang="en-US" sz="1800">
+                          <a:effectLst/>
+                        </a:rPr>
+                        <a:t>Naïve</a:t>
+                      </a:r>
+                      <a:endParaRPr lang="nl-NL" sz="1800">
+                        <a:effectLst/>
+                        <a:latin typeface="Calibri"/>
+                        <a:ea typeface="Calibri"/>
+                        <a:cs typeface="Times New Roman"/>
+                      </a:endParaRPr>
+                    </a:p>
+                  </a:txBody>
+                  <a:tcPr marL="68580" marR="68580" marT="0" marB="0"/>
+                </a:tc>
+                <a:tc>
+                  <a:txBody>
+                    <a:bodyPr/>
+                    <a:lstStyle/>
+                    <a:p>
+                      <a:pPr>
+                        <a:lnSpc>
+                          <a:spcPct val="107000"/>
+                        </a:lnSpc>
+                        <a:spcAft>
+                          <a:spcPts val="0"/>
+                        </a:spcAft>
+                      </a:pPr>
+                      <a:r>
+                        <a:rPr lang="en-US" sz="1800">
+                          <a:effectLst/>
+                        </a:rPr>
+                        <a:t>6.12138</a:t>
+                      </a:r>
+                      <a:endParaRPr lang="nl-NL" sz="1800">
+                        <a:effectLst/>
+                        <a:latin typeface="Calibri"/>
+                        <a:ea typeface="Calibri"/>
+                        <a:cs typeface="Times New Roman"/>
+                      </a:endParaRPr>
+                    </a:p>
+                  </a:txBody>
+                  <a:tcPr marL="68580" marR="68580" marT="0" marB="0"/>
+                </a:tc>
+                <a:tc>
+                  <a:txBody>
+                    <a:bodyPr/>
+                    <a:lstStyle/>
+                    <a:p>
+                      <a:pPr>
+                        <a:lnSpc>
+                          <a:spcPct val="107000"/>
+                        </a:lnSpc>
+                        <a:spcAft>
+                          <a:spcPts val="0"/>
+                        </a:spcAft>
+                      </a:pPr>
+                      <a:r>
+                        <a:rPr lang="en-US" sz="1800">
+                          <a:effectLst/>
+                        </a:rPr>
+                        <a:t>3072</a:t>
+                      </a:r>
+                      <a:endParaRPr lang="nl-NL" sz="1800">
+                        <a:effectLst/>
+                        <a:latin typeface="Calibri"/>
+                        <a:ea typeface="Calibri"/>
+                        <a:cs typeface="Times New Roman"/>
+                      </a:endParaRPr>
+                    </a:p>
+                  </a:txBody>
+                  <a:tcPr marL="68580" marR="68580" marT="0" marB="0"/>
+                </a:tc>
+              </a:tr>
+              <a:tr h="296667">
+                <a:tc>
+                  <a:txBody>
+                    <a:bodyPr/>
+                    <a:lstStyle/>
+                    <a:p>
+                      <a:pPr>
+                        <a:lnSpc>
+                          <a:spcPct val="107000"/>
+                        </a:lnSpc>
+                        <a:spcAft>
+                          <a:spcPts val="0"/>
+                        </a:spcAft>
+                      </a:pPr>
+                      <a:r>
+                        <a:rPr lang="en-US" sz="1800">
+                          <a:effectLst/>
+                        </a:rPr>
+                        <a:t>SGD Regressor</a:t>
+                      </a:r>
+                      <a:endParaRPr lang="nl-NL" sz="1800">
+                        <a:effectLst/>
+                        <a:latin typeface="Calibri"/>
+                        <a:ea typeface="Calibri"/>
+                        <a:cs typeface="Times New Roman"/>
+                      </a:endParaRPr>
+                    </a:p>
+                  </a:txBody>
+                  <a:tcPr marL="68580" marR="68580" marT="0" marB="0"/>
+                </a:tc>
+                <a:tc>
+                  <a:txBody>
+                    <a:bodyPr/>
+                    <a:lstStyle/>
+                    <a:p>
+                      <a:pPr>
+                        <a:lnSpc>
+                          <a:spcPct val="107000"/>
+                        </a:lnSpc>
+                        <a:spcAft>
+                          <a:spcPts val="0"/>
+                        </a:spcAft>
+                      </a:pPr>
+                      <a:r>
+                        <a:rPr lang="en-US" sz="1800">
+                          <a:effectLst/>
+                        </a:rPr>
+                        <a:t>Naïve</a:t>
+                      </a:r>
+                      <a:endParaRPr lang="nl-NL" sz="1800">
+                        <a:effectLst/>
+                        <a:latin typeface="Calibri"/>
+                        <a:ea typeface="Calibri"/>
+                        <a:cs typeface="Times New Roman"/>
+                      </a:endParaRPr>
+                    </a:p>
+                  </a:txBody>
+                  <a:tcPr marL="68580" marR="68580" marT="0" marB="0"/>
+                </a:tc>
+                <a:tc>
+                  <a:txBody>
+                    <a:bodyPr/>
+                    <a:lstStyle/>
+                    <a:p>
+                      <a:pPr>
+                        <a:lnSpc>
+                          <a:spcPct val="107000"/>
+                        </a:lnSpc>
+                        <a:spcAft>
+                          <a:spcPts val="0"/>
+                        </a:spcAft>
+                      </a:pPr>
+                      <a:r>
+                        <a:rPr lang="en-US" sz="1800">
+                          <a:effectLst/>
+                        </a:rPr>
+                        <a:t>0.59560</a:t>
+                      </a:r>
+                      <a:endParaRPr lang="nl-NL" sz="1800">
+                        <a:effectLst/>
+                        <a:latin typeface="Calibri"/>
+                        <a:ea typeface="Calibri"/>
+                        <a:cs typeface="Times New Roman"/>
+                      </a:endParaRPr>
+                    </a:p>
+                  </a:txBody>
+                  <a:tcPr marL="68580" marR="68580" marT="0" marB="0"/>
+                </a:tc>
+                <a:tc>
+                  <a:txBody>
+                    <a:bodyPr/>
+                    <a:lstStyle/>
+                    <a:p>
+                      <a:pPr>
+                        <a:lnSpc>
+                          <a:spcPct val="107000"/>
+                        </a:lnSpc>
+                        <a:spcAft>
+                          <a:spcPts val="0"/>
+                        </a:spcAft>
+                      </a:pPr>
+                      <a:r>
+                        <a:rPr lang="en-US" sz="1800">
+                          <a:effectLst/>
+                        </a:rPr>
+                        <a:t>3021</a:t>
+                      </a:r>
+                      <a:endParaRPr lang="nl-NL" sz="1800">
+                        <a:effectLst/>
+                        <a:latin typeface="Calibri"/>
+                        <a:ea typeface="Calibri"/>
+                        <a:cs typeface="Times New Roman"/>
+                      </a:endParaRPr>
+                    </a:p>
+                  </a:txBody>
+                  <a:tcPr marL="68580" marR="68580" marT="0" marB="0"/>
+                </a:tc>
+              </a:tr>
+              <a:tr h="607115">
+                <a:tc>
+                  <a:txBody>
+                    <a:bodyPr/>
+                    <a:lstStyle/>
+                    <a:p>
+                      <a:pPr>
+                        <a:lnSpc>
+                          <a:spcPct val="107000"/>
+                        </a:lnSpc>
+                        <a:spcAft>
+                          <a:spcPts val="0"/>
+                        </a:spcAft>
+                      </a:pPr>
+                      <a:r>
+                        <a:rPr lang="en-US" sz="1800">
+                          <a:effectLst/>
+                        </a:rPr>
+                        <a:t>Linear Regression</a:t>
+                      </a:r>
+                      <a:endParaRPr lang="nl-NL" sz="1800">
+                        <a:effectLst/>
+                        <a:latin typeface="Calibri"/>
+                        <a:ea typeface="Calibri"/>
+                        <a:cs typeface="Times New Roman"/>
+                      </a:endParaRPr>
+                    </a:p>
+                  </a:txBody>
+                  <a:tcPr marL="68580" marR="68580" marT="0" marB="0"/>
+                </a:tc>
+                <a:tc>
+                  <a:txBody>
+                    <a:bodyPr/>
+                    <a:lstStyle/>
+                    <a:p>
+                      <a:pPr>
+                        <a:lnSpc>
+                          <a:spcPct val="107000"/>
+                        </a:lnSpc>
+                        <a:spcAft>
+                          <a:spcPts val="0"/>
+                        </a:spcAft>
+                      </a:pPr>
+                      <a:r>
+                        <a:rPr lang="en-US" sz="1800">
+                          <a:effectLst/>
+                        </a:rPr>
+                        <a:t>Complete dataset</a:t>
+                      </a:r>
+                      <a:endParaRPr lang="nl-NL" sz="1800">
+                        <a:effectLst/>
+                      </a:endParaRPr>
+                    </a:p>
+                    <a:p>
+                      <a:pPr>
+                        <a:lnSpc>
+                          <a:spcPct val="107000"/>
+                        </a:lnSpc>
+                        <a:spcAft>
+                          <a:spcPts val="0"/>
+                        </a:spcAft>
+                      </a:pPr>
+                      <a:r>
+                        <a:rPr lang="en-US" sz="1800">
+                          <a:effectLst/>
+                        </a:rPr>
+                        <a:t>Only 2015</a:t>
+                      </a:r>
+                      <a:endParaRPr lang="nl-NL" sz="1800">
+                        <a:effectLst/>
+                        <a:latin typeface="Calibri"/>
+                        <a:ea typeface="Calibri"/>
+                        <a:cs typeface="Times New Roman"/>
+                      </a:endParaRPr>
+                    </a:p>
+                  </a:txBody>
+                  <a:tcPr marL="68580" marR="68580" marT="0" marB="0"/>
+                </a:tc>
+                <a:tc>
+                  <a:txBody>
+                    <a:bodyPr/>
+                    <a:lstStyle/>
+                    <a:p>
+                      <a:pPr>
+                        <a:lnSpc>
+                          <a:spcPct val="107000"/>
+                        </a:lnSpc>
+                        <a:spcAft>
+                          <a:spcPts val="0"/>
+                        </a:spcAft>
+                      </a:pPr>
+                      <a:r>
+                        <a:rPr lang="en-US" sz="1800">
+                          <a:effectLst/>
+                        </a:rPr>
+                        <a:t>0.49689</a:t>
+                      </a:r>
+                      <a:endParaRPr lang="nl-NL" sz="1800">
+                        <a:effectLst/>
+                        <a:latin typeface="Calibri"/>
+                        <a:ea typeface="Calibri"/>
+                        <a:cs typeface="Times New Roman"/>
+                      </a:endParaRPr>
+                    </a:p>
+                  </a:txBody>
+                  <a:tcPr marL="68580" marR="68580" marT="0" marB="0"/>
+                </a:tc>
+                <a:tc>
+                  <a:txBody>
+                    <a:bodyPr/>
+                    <a:lstStyle/>
+                    <a:p>
+                      <a:pPr>
+                        <a:lnSpc>
+                          <a:spcPct val="107000"/>
+                        </a:lnSpc>
+                        <a:spcAft>
+                          <a:spcPts val="0"/>
+                        </a:spcAft>
+                      </a:pPr>
+                      <a:r>
+                        <a:rPr lang="en-US" sz="1800">
+                          <a:effectLst/>
+                        </a:rPr>
+                        <a:t>2897</a:t>
+                      </a:r>
+                      <a:endParaRPr lang="nl-NL" sz="1800">
+                        <a:effectLst/>
+                        <a:latin typeface="Calibri"/>
+                        <a:ea typeface="Calibri"/>
+                        <a:cs typeface="Times New Roman"/>
+                      </a:endParaRPr>
+                    </a:p>
+                  </a:txBody>
+                  <a:tcPr marL="68580" marR="68580" marT="0" marB="0"/>
+                </a:tc>
+              </a:tr>
+              <a:tr h="917562">
+                <a:tc>
+                  <a:txBody>
+                    <a:bodyPr/>
+                    <a:lstStyle/>
+                    <a:p>
+                      <a:pPr>
+                        <a:lnSpc>
+                          <a:spcPct val="107000"/>
+                        </a:lnSpc>
+                        <a:spcAft>
+                          <a:spcPts val="0"/>
+                        </a:spcAft>
+                      </a:pPr>
+                      <a:r>
+                        <a:rPr lang="en-US" sz="1800">
+                          <a:effectLst/>
+                        </a:rPr>
+                        <a:t>KNNeighbors</a:t>
+                      </a:r>
+                      <a:endParaRPr lang="nl-NL" sz="1800">
+                        <a:effectLst/>
+                        <a:latin typeface="Calibri"/>
+                        <a:ea typeface="Calibri"/>
+                        <a:cs typeface="Times New Roman"/>
+                      </a:endParaRPr>
+                    </a:p>
+                  </a:txBody>
+                  <a:tcPr marL="68580" marR="68580" marT="0" marB="0"/>
+                </a:tc>
+                <a:tc>
+                  <a:txBody>
+                    <a:bodyPr/>
+                    <a:lstStyle/>
+                    <a:p>
+                      <a:pPr>
+                        <a:lnSpc>
+                          <a:spcPct val="107000"/>
+                        </a:lnSpc>
+                        <a:spcAft>
+                          <a:spcPts val="0"/>
+                        </a:spcAft>
+                      </a:pPr>
+                      <a:r>
+                        <a:rPr lang="en-US" sz="1800">
+                          <a:effectLst/>
+                        </a:rPr>
+                        <a:t>Amount of neighbors (6)</a:t>
+                      </a:r>
+                      <a:endParaRPr lang="nl-NL" sz="1800">
+                        <a:effectLst/>
+                      </a:endParaRPr>
+                    </a:p>
+                    <a:p>
+                      <a:pPr>
+                        <a:lnSpc>
+                          <a:spcPct val="107000"/>
+                        </a:lnSpc>
+                        <a:spcAft>
+                          <a:spcPts val="0"/>
+                        </a:spcAft>
+                      </a:pPr>
+                      <a:r>
+                        <a:rPr lang="en-US" sz="1800">
+                          <a:effectLst/>
+                        </a:rPr>
+                        <a:t>Removing outliers</a:t>
+                      </a:r>
+                      <a:endParaRPr lang="nl-NL" sz="1800">
+                        <a:effectLst/>
+                      </a:endParaRPr>
+                    </a:p>
+                    <a:p>
+                      <a:pPr>
+                        <a:lnSpc>
+                          <a:spcPct val="107000"/>
+                        </a:lnSpc>
+                        <a:spcAft>
+                          <a:spcPts val="0"/>
+                        </a:spcAft>
+                      </a:pPr>
+                      <a:r>
+                        <a:rPr lang="en-US" sz="1800">
+                          <a:effectLst/>
+                        </a:rPr>
+                        <a:t>Only 2015</a:t>
+                      </a:r>
+                      <a:endParaRPr lang="nl-NL" sz="1800">
+                        <a:effectLst/>
+                        <a:latin typeface="Calibri"/>
+                        <a:ea typeface="Calibri"/>
+                        <a:cs typeface="Times New Roman"/>
+                      </a:endParaRPr>
+                    </a:p>
+                  </a:txBody>
+                  <a:tcPr marL="68580" marR="68580" marT="0" marB="0"/>
+                </a:tc>
+                <a:tc>
+                  <a:txBody>
+                    <a:bodyPr/>
+                    <a:lstStyle/>
+                    <a:p>
+                      <a:pPr>
+                        <a:lnSpc>
+                          <a:spcPct val="107000"/>
+                        </a:lnSpc>
+                        <a:spcAft>
+                          <a:spcPts val="0"/>
+                        </a:spcAft>
+                      </a:pPr>
+                      <a:r>
+                        <a:rPr lang="en-US" sz="1800">
+                          <a:effectLst/>
+                        </a:rPr>
+                        <a:t>0.93122</a:t>
+                      </a:r>
+                      <a:endParaRPr lang="nl-NL" sz="1800">
+                        <a:effectLst/>
+                        <a:latin typeface="Calibri"/>
+                        <a:ea typeface="Calibri"/>
+                        <a:cs typeface="Times New Roman"/>
+                      </a:endParaRPr>
+                    </a:p>
+                  </a:txBody>
+                  <a:tcPr marL="68580" marR="68580" marT="0" marB="0"/>
+                </a:tc>
+                <a:tc>
+                  <a:txBody>
+                    <a:bodyPr/>
+                    <a:lstStyle/>
+                    <a:p>
+                      <a:pPr>
+                        <a:lnSpc>
+                          <a:spcPct val="107000"/>
+                        </a:lnSpc>
+                        <a:spcAft>
+                          <a:spcPts val="0"/>
+                        </a:spcAft>
+                      </a:pPr>
+                      <a:r>
+                        <a:rPr lang="en-US" sz="1800">
+                          <a:effectLst/>
+                        </a:rPr>
+                        <a:t>3050</a:t>
+                      </a:r>
+                      <a:endParaRPr lang="nl-NL" sz="1800">
+                        <a:effectLst/>
+                        <a:latin typeface="Calibri"/>
+                        <a:ea typeface="Calibri"/>
+                        <a:cs typeface="Times New Roman"/>
+                      </a:endParaRPr>
+                    </a:p>
+                  </a:txBody>
+                  <a:tcPr marL="68580" marR="68580" marT="0" marB="0"/>
+                </a:tc>
+              </a:tr>
+              <a:tr h="607115">
+                <a:tc>
+                  <a:txBody>
+                    <a:bodyPr/>
+                    <a:lstStyle/>
+                    <a:p>
+                      <a:pPr>
+                        <a:lnSpc>
+                          <a:spcPct val="107000"/>
+                        </a:lnSpc>
+                        <a:spcAft>
+                          <a:spcPts val="0"/>
+                        </a:spcAft>
+                      </a:pPr>
+                      <a:r>
+                        <a:rPr lang="en-US" sz="1800">
+                          <a:effectLst/>
+                        </a:rPr>
+                        <a:t>Decision Tree</a:t>
+                      </a:r>
+                      <a:endParaRPr lang="nl-NL" sz="1800">
+                        <a:effectLst/>
+                        <a:latin typeface="Calibri"/>
+                        <a:ea typeface="Calibri"/>
+                        <a:cs typeface="Times New Roman"/>
+                      </a:endParaRPr>
+                    </a:p>
+                  </a:txBody>
+                  <a:tcPr marL="68580" marR="68580" marT="0" marB="0"/>
+                </a:tc>
+                <a:tc>
+                  <a:txBody>
+                    <a:bodyPr/>
+                    <a:lstStyle/>
+                    <a:p>
+                      <a:pPr>
+                        <a:lnSpc>
+                          <a:spcPct val="107000"/>
+                        </a:lnSpc>
+                        <a:spcAft>
+                          <a:spcPts val="0"/>
+                        </a:spcAft>
+                      </a:pPr>
+                      <a:r>
+                        <a:rPr lang="en-US" sz="1800">
+                          <a:effectLst/>
+                        </a:rPr>
+                        <a:t>Complete dataset</a:t>
+                      </a:r>
+                      <a:endParaRPr lang="nl-NL" sz="1800">
+                        <a:effectLst/>
+                      </a:endParaRPr>
+                    </a:p>
+                    <a:p>
+                      <a:pPr>
+                        <a:lnSpc>
+                          <a:spcPct val="107000"/>
+                        </a:lnSpc>
+                        <a:spcAft>
+                          <a:spcPts val="0"/>
+                        </a:spcAft>
+                      </a:pPr>
+                      <a:r>
+                        <a:rPr lang="en-US" sz="1800">
+                          <a:effectLst/>
+                        </a:rPr>
+                        <a:t>Only 2015</a:t>
+                      </a:r>
+                      <a:endParaRPr lang="nl-NL" sz="1800">
+                        <a:effectLst/>
+                        <a:latin typeface="Calibri"/>
+                        <a:ea typeface="Calibri"/>
+                        <a:cs typeface="Times New Roman"/>
+                      </a:endParaRPr>
+                    </a:p>
+                  </a:txBody>
+                  <a:tcPr marL="68580" marR="68580" marT="0" marB="0"/>
+                </a:tc>
+                <a:tc>
+                  <a:txBody>
+                    <a:bodyPr/>
+                    <a:lstStyle/>
+                    <a:p>
+                      <a:pPr>
+                        <a:lnSpc>
+                          <a:spcPct val="107000"/>
+                        </a:lnSpc>
+                        <a:spcAft>
+                          <a:spcPts val="0"/>
+                        </a:spcAft>
+                      </a:pPr>
+                      <a:r>
+                        <a:rPr lang="en-US" sz="1800">
+                          <a:effectLst/>
+                        </a:rPr>
+                        <a:t>0.58460</a:t>
+                      </a:r>
+                      <a:endParaRPr lang="nl-NL" sz="1800">
+                        <a:effectLst/>
+                        <a:latin typeface="Calibri"/>
+                        <a:ea typeface="Calibri"/>
+                        <a:cs typeface="Times New Roman"/>
+                      </a:endParaRPr>
+                    </a:p>
+                  </a:txBody>
+                  <a:tcPr marL="68580" marR="68580" marT="0" marB="0"/>
+                </a:tc>
+                <a:tc>
+                  <a:txBody>
+                    <a:bodyPr/>
+                    <a:lstStyle/>
+                    <a:p>
+                      <a:pPr>
+                        <a:lnSpc>
+                          <a:spcPct val="107000"/>
+                        </a:lnSpc>
+                        <a:spcAft>
+                          <a:spcPts val="0"/>
+                        </a:spcAft>
+                      </a:pPr>
+                      <a:r>
+                        <a:rPr lang="en-US" sz="1800">
+                          <a:effectLst/>
+                        </a:rPr>
+                        <a:t>3020</a:t>
+                      </a:r>
+                      <a:endParaRPr lang="nl-NL" sz="1800">
+                        <a:effectLst/>
+                        <a:latin typeface="Calibri"/>
+                        <a:ea typeface="Calibri"/>
+                        <a:cs typeface="Times New Roman"/>
+                      </a:endParaRPr>
+                    </a:p>
+                  </a:txBody>
+                  <a:tcPr marL="68580" marR="68580" marT="0" marB="0"/>
+                </a:tc>
+              </a:tr>
+              <a:tr h="607115">
+                <a:tc>
+                  <a:txBody>
+                    <a:bodyPr/>
+                    <a:lstStyle/>
+                    <a:p>
+                      <a:pPr>
+                        <a:lnSpc>
+                          <a:spcPct val="107000"/>
+                        </a:lnSpc>
+                        <a:spcAft>
+                          <a:spcPts val="0"/>
+                        </a:spcAft>
+                      </a:pPr>
+                      <a:r>
+                        <a:rPr lang="en-US" sz="1800">
+                          <a:effectLst/>
+                        </a:rPr>
+                        <a:t>Random Forest</a:t>
+                      </a:r>
+                      <a:endParaRPr lang="nl-NL" sz="1800">
+                        <a:effectLst/>
+                        <a:latin typeface="Calibri"/>
+                        <a:ea typeface="Calibri"/>
+                        <a:cs typeface="Times New Roman"/>
+                      </a:endParaRPr>
+                    </a:p>
+                  </a:txBody>
+                  <a:tcPr marL="68580" marR="68580" marT="0" marB="0"/>
+                </a:tc>
+                <a:tc>
+                  <a:txBody>
+                    <a:bodyPr/>
+                    <a:lstStyle/>
+                    <a:p>
+                      <a:pPr>
+                        <a:lnSpc>
+                          <a:spcPct val="107000"/>
+                        </a:lnSpc>
+                        <a:spcAft>
+                          <a:spcPts val="0"/>
+                        </a:spcAft>
+                      </a:pPr>
+                      <a:r>
+                        <a:rPr lang="en-US" sz="1800">
+                          <a:effectLst/>
+                        </a:rPr>
+                        <a:t>Removing outliers</a:t>
+                      </a:r>
+                      <a:endParaRPr lang="nl-NL" sz="1800">
+                        <a:effectLst/>
+                      </a:endParaRPr>
+                    </a:p>
+                    <a:p>
+                      <a:pPr>
+                        <a:lnSpc>
+                          <a:spcPct val="107000"/>
+                        </a:lnSpc>
+                        <a:spcAft>
+                          <a:spcPts val="0"/>
+                        </a:spcAft>
+                      </a:pPr>
+                      <a:r>
+                        <a:rPr lang="en-US" sz="1800">
+                          <a:effectLst/>
+                        </a:rPr>
+                        <a:t>Only 2015</a:t>
+                      </a:r>
+                      <a:endParaRPr lang="nl-NL" sz="1800">
+                        <a:effectLst/>
+                        <a:latin typeface="Calibri"/>
+                        <a:ea typeface="Calibri"/>
+                        <a:cs typeface="Times New Roman"/>
+                      </a:endParaRPr>
+                    </a:p>
+                  </a:txBody>
+                  <a:tcPr marL="68580" marR="68580" marT="0" marB="0"/>
+                </a:tc>
+                <a:tc>
+                  <a:txBody>
+                    <a:bodyPr/>
+                    <a:lstStyle/>
+                    <a:p>
+                      <a:pPr>
+                        <a:lnSpc>
+                          <a:spcPct val="107000"/>
+                        </a:lnSpc>
+                        <a:spcAft>
+                          <a:spcPts val="0"/>
+                        </a:spcAft>
+                      </a:pPr>
+                      <a:r>
+                        <a:rPr lang="en-US" sz="1800">
+                          <a:effectLst/>
+                        </a:rPr>
+                        <a:t>0.75239</a:t>
+                      </a:r>
+                      <a:endParaRPr lang="nl-NL" sz="1800">
+                        <a:effectLst/>
+                        <a:latin typeface="Calibri"/>
+                        <a:ea typeface="Calibri"/>
+                        <a:cs typeface="Times New Roman"/>
+                      </a:endParaRPr>
+                    </a:p>
+                  </a:txBody>
+                  <a:tcPr marL="68580" marR="68580" marT="0" marB="0"/>
+                </a:tc>
+                <a:tc>
+                  <a:txBody>
+                    <a:bodyPr/>
+                    <a:lstStyle/>
+                    <a:p>
+                      <a:pPr>
+                        <a:lnSpc>
+                          <a:spcPct val="107000"/>
+                        </a:lnSpc>
+                        <a:spcAft>
+                          <a:spcPts val="0"/>
+                        </a:spcAft>
+                      </a:pPr>
+                      <a:r>
+                        <a:rPr lang="en-US" sz="1800">
+                          <a:effectLst/>
+                        </a:rPr>
+                        <a:t>3040</a:t>
+                      </a:r>
+                      <a:endParaRPr lang="nl-NL" sz="1800">
+                        <a:effectLst/>
+                        <a:latin typeface="Calibri"/>
+                        <a:ea typeface="Calibri"/>
+                        <a:cs typeface="Times New Roman"/>
+                      </a:endParaRPr>
+                    </a:p>
+                  </a:txBody>
+                  <a:tcPr marL="68580" marR="68580" marT="0" marB="0"/>
+                </a:tc>
+              </a:tr>
+              <a:tr h="607115">
+                <a:tc>
+                  <a:txBody>
+                    <a:bodyPr/>
+                    <a:lstStyle/>
+                    <a:p>
+                      <a:pPr>
+                        <a:lnSpc>
+                          <a:spcPct val="107000"/>
+                        </a:lnSpc>
+                        <a:spcAft>
+                          <a:spcPts val="0"/>
+                        </a:spcAft>
+                      </a:pPr>
+                      <a:r>
+                        <a:rPr lang="en-US" sz="1800">
+                          <a:effectLst/>
+                        </a:rPr>
+                        <a:t>Gradientboosting Regressor</a:t>
+                      </a:r>
+                      <a:endParaRPr lang="nl-NL" sz="1800">
+                        <a:effectLst/>
+                        <a:latin typeface="Calibri"/>
+                        <a:ea typeface="Calibri"/>
+                        <a:cs typeface="Times New Roman"/>
+                      </a:endParaRPr>
+                    </a:p>
+                  </a:txBody>
+                  <a:tcPr marL="68580" marR="68580" marT="0" marB="0"/>
+                </a:tc>
+                <a:tc>
+                  <a:txBody>
+                    <a:bodyPr/>
+                    <a:lstStyle/>
+                    <a:p>
+                      <a:pPr>
+                        <a:lnSpc>
+                          <a:spcPct val="107000"/>
+                        </a:lnSpc>
+                        <a:spcAft>
+                          <a:spcPts val="0"/>
+                        </a:spcAft>
+                      </a:pPr>
+                      <a:r>
+                        <a:rPr lang="en-US" sz="1800">
+                          <a:effectLst/>
+                        </a:rPr>
+                        <a:t>Complete dataset</a:t>
+                      </a:r>
+                      <a:endParaRPr lang="nl-NL" sz="1800">
+                        <a:effectLst/>
+                      </a:endParaRPr>
+                    </a:p>
+                    <a:p>
+                      <a:pPr>
+                        <a:lnSpc>
+                          <a:spcPct val="107000"/>
+                        </a:lnSpc>
+                        <a:spcAft>
+                          <a:spcPts val="0"/>
+                        </a:spcAft>
+                      </a:pPr>
+                      <a:r>
+                        <a:rPr lang="en-US" sz="1800">
+                          <a:effectLst/>
+                        </a:rPr>
+                        <a:t>Only 2015</a:t>
+                      </a:r>
+                      <a:endParaRPr lang="nl-NL" sz="1800">
+                        <a:effectLst/>
+                        <a:latin typeface="Calibri"/>
+                        <a:ea typeface="Calibri"/>
+                        <a:cs typeface="Times New Roman"/>
+                      </a:endParaRPr>
+                    </a:p>
+                  </a:txBody>
+                  <a:tcPr marL="68580" marR="68580" marT="0" marB="0"/>
+                </a:tc>
+                <a:tc>
+                  <a:txBody>
+                    <a:bodyPr/>
+                    <a:lstStyle/>
+                    <a:p>
+                      <a:pPr>
+                        <a:lnSpc>
+                          <a:spcPct val="107000"/>
+                        </a:lnSpc>
+                        <a:spcAft>
+                          <a:spcPts val="0"/>
+                        </a:spcAft>
+                      </a:pPr>
+                      <a:r>
+                        <a:rPr lang="en-US" sz="1800">
+                          <a:effectLst/>
+                        </a:rPr>
+                        <a:t>0.41384</a:t>
+                      </a:r>
+                      <a:endParaRPr lang="nl-NL" sz="1800">
+                        <a:effectLst/>
+                        <a:latin typeface="Calibri"/>
+                        <a:ea typeface="Calibri"/>
+                        <a:cs typeface="Times New Roman"/>
+                      </a:endParaRPr>
+                    </a:p>
+                  </a:txBody>
+                  <a:tcPr marL="68580" marR="68580" marT="0" marB="0"/>
+                </a:tc>
+                <a:tc>
+                  <a:txBody>
+                    <a:bodyPr/>
+                    <a:lstStyle/>
+                    <a:p>
+                      <a:pPr>
+                        <a:lnSpc>
+                          <a:spcPct val="107000"/>
+                        </a:lnSpc>
+                        <a:spcAft>
+                          <a:spcPts val="0"/>
+                        </a:spcAft>
+                      </a:pPr>
+                      <a:r>
+                        <a:rPr lang="en-US" sz="1800" dirty="0">
+                          <a:effectLst/>
+                        </a:rPr>
+                        <a:t>2767</a:t>
+                      </a:r>
+                      <a:endParaRPr lang="nl-NL" sz="1800" dirty="0">
+                        <a:effectLst/>
+                        <a:latin typeface="Calibri"/>
+                        <a:ea typeface="Calibri"/>
+                        <a:cs typeface="Times New Roman"/>
+                      </a:endParaRPr>
+                    </a:p>
+                  </a:txBody>
+                  <a:tcPr marL="68580" marR="68580" marT="0" marB="0"/>
+                </a:tc>
+              </a:tr>
+            </a:tbl>
+          </a:graphicData>
+        </a:graphic>
+      </p:graphicFrame>
+      <p:sp>
+        <p:nvSpPr>
+          <p:cNvPr id="18" name="Rectangle 10"/>
+          <p:cNvSpPr>
+            <a:spLocks noChangeArrowheads="1"/>
+          </p:cNvSpPr>
+          <p:nvPr/>
+        </p:nvSpPr>
+        <p:spPr bwMode="auto">
+          <a:xfrm>
+            <a:off x="5929313" y="3679825"/>
+            <a:ext cx="17348200" cy="0"/>
+          </a:xfrm>
+          <a:prstGeom prst="rect">
+            <a:avLst/>
+          </a:prstGeom>
+          <a:noFill/>
+          <a:ln>
+            <a:noFill/>
+          </a:ln>
+          <a:effectLst/>
+          <a:extLst>
+            <a:ext uri="{909E8E84-426E-40DD-AFC4-6F175D3DCCD1}">
+              <a14:hiddenFill xmlns:a14="http://schemas.microsoft.com/office/drawing/2010/main">
+                <a:solidFill>
+                  <a:schemeClr val="accent1"/>
+                </a:solidFill>
+              </a14:hiddenFill>
+            </a:ext>
+            <a:ext uri="{91240B29-F687-4F45-9708-019B960494DF}">
+              <a14:hiddenLine xmlns:a14="http://schemas.microsoft.com/office/drawing/2010/main" w="9525">
+                <a:solidFill>
+                  <a:schemeClr val="tx1"/>
+                </a:solidFill>
+                <a:miter lim="800000"/>
+                <a:headEnd/>
+                <a:tailEnd/>
+              </a14:hiddenLine>
+            </a:ext>
+            <a:ext uri="{AF507438-7753-43E0-B8FC-AC1667EBCBE1}">
+              <a14:hiddenEffects xmlns:a14="http://schemas.microsoft.com/office/drawing/2010/main">
+                <a:effectLst>
+                  <a:outerShdw dist="35921" dir="2700000" algn="ctr" rotWithShape="0">
+                    <a:schemeClr val="bg2"/>
+                  </a:outerShdw>
+                </a:effectLst>
+              </a14:hiddenEffects>
+            </a:ext>
+          </a:extLst>
+        </p:spPr>
+        <p:txBody>
+          <a:bodyPr vert="horz" wrap="none" lIns="91440" tIns="45720" rIns="91440" bIns="45720" numCol="1" anchor="ctr" anchorCtr="0" compatLnSpc="1">
+            <a:prstTxWarp prst="textNoShape">
+              <a:avLst/>
+            </a:prstTxWarp>
+            <a:spAutoFit/>
+          </a:bodyPr>
+          <a:lstStyle/>
+          <a:p>
+            <a:pPr marL="0" marR="0" lvl="0" indent="0" algn="l" defTabSz="914400" rtl="0" eaLnBrk="1" fontAlgn="base" latinLnBrk="0" hangingPunct="1">
+              <a:lnSpc>
+                <a:spcPct val="100000"/>
+              </a:lnSpc>
+              <a:spcBef>
+                <a:spcPct val="0"/>
+              </a:spcBef>
+              <a:spcAft>
+                <a:spcPct val="0"/>
+              </a:spcAft>
+              <a:buClrTx/>
+              <a:buSzTx/>
+              <a:buFontTx/>
+              <a:buNone/>
+              <a:tabLst/>
+            </a:pPr>
+            <a:r>
+              <a:rPr kumimoji="0" lang="nl-NL" altLang="nl-NL" sz="1800" b="0" i="0" u="none" strike="noStrike" cap="none" normalizeH="0" baseline="0" smtClean="0">
+                <a:ln>
+                  <a:noFill/>
+                </a:ln>
+                <a:solidFill>
+                  <a:schemeClr val="tx1"/>
+                </a:solidFill>
+                <a:effectLst/>
+                <a:latin typeface="Arial" pitchFamily="34" charset="0"/>
+                <a:cs typeface="Arial" pitchFamily="34" charset="0"/>
+              </a:rPr>
+              <a:t/>
+            </a:r>
+            <a:br>
+              <a:rPr kumimoji="0" lang="nl-NL" altLang="nl-NL" sz="1800" b="0" i="0" u="none" strike="noStrike" cap="none" normalizeH="0" baseline="0" smtClean="0">
+                <a:ln>
+                  <a:noFill/>
+                </a:ln>
+                <a:solidFill>
+                  <a:schemeClr val="tx1"/>
+                </a:solidFill>
+                <a:effectLst/>
+                <a:latin typeface="Arial" pitchFamily="34" charset="0"/>
+                <a:cs typeface="Arial" pitchFamily="34" charset="0"/>
+              </a:rPr>
+            </a:br>
+            <a:endParaRPr kumimoji="0" lang="nl-NL" altLang="nl-NL" sz="1800" b="0" i="0" u="none" strike="noStrike" cap="none" normalizeH="0" baseline="0" smtClean="0">
+              <a:ln>
+                <a:noFill/>
+              </a:ln>
+              <a:solidFill>
+                <a:schemeClr val="tx1"/>
+              </a:solidFill>
+              <a:effectLst/>
+              <a:latin typeface="Arial" pitchFamily="34" charset="0"/>
+              <a:cs typeface="Arial" pitchFamily="34" charset="0"/>
+            </a:endParaRPr>
+          </a:p>
+        </p:txBody>
+      </p:sp>
     </p:spTree>
     <p:extLst>
       <p:ext uri="{BB962C8B-B14F-4D97-AF65-F5344CB8AC3E}">
@@ -9165,7 +11126,7 @@
   <a:extraClrSchemeLst/>
   <a:extLst>
     <a:ext uri="{05A4C25C-085E-4340-85A3-A5531E510DB2}">
-      <thm15:themeFamily xmlns="" xmlns:thm15="http://schemas.microsoft.com/office/thememl/2012/main" name="RU_PPT_ENG_CP" id="{A2B2A2E5-8C10-3D48-B879-97090C454E52}" vid="{FD09F00C-FDC6-E347-A03D-C9781C1DC58D}"/>
+      <thm15:themeFamily xmlns:thm15="http://schemas.microsoft.com/office/thememl/2012/main" xmlns="" name="RU_PPT_ENG_CP" id="{A2B2A2E5-8C10-3D48-B879-97090C454E52}" vid="{FD09F00C-FDC6-E347-A03D-C9781C1DC58D}"/>
     </a:ext>
   </a:extLst>
 </a:theme>
@@ -9505,7 +11466,7 @@
   <a:extraClrSchemeLst/>
   <a:extLst>
     <a:ext uri="{05A4C25C-085E-4340-85A3-A5531E510DB2}">
-      <thm15:themeFamily xmlns="" xmlns:thm15="http://schemas.microsoft.com/office/thememl/2012/main" name="RU_PPT_ENG_CP" id="{A2B2A2E5-8C10-3D48-B879-97090C454E52}" vid="{7DEE8FA5-744F-DF47-8956-AA68E72134BF}"/>
+      <thm15:themeFamily xmlns:thm15="http://schemas.microsoft.com/office/thememl/2012/main" xmlns="" name="RU_PPT_ENG_CP" id="{A2B2A2E5-8C10-3D48-B879-97090C454E52}" vid="{7DEE8FA5-744F-DF47-8956-AA68E72134BF}"/>
     </a:ext>
   </a:extLst>
 </a:theme>

</xml_diff>

<commit_message>
Improved slides about evaluation and pre-processing
</commit_message>
<xml_diff>
--- a/presentatie/Classified_MLiP_final_presentation_2.pptx
+++ b/presentatie/Classified_MLiP_final_presentation_2.pptx
@@ -156,7 +156,7 @@
   </p:defaultTextStyle>
   <p:extLst>
     <p:ext uri="{EFAFB233-063F-42B5-8137-9DF3F51BA10A}">
-      <p15:sldGuideLst xmlns:p15="http://schemas.microsoft.com/office/powerpoint/2012/main" xmlns="">
+      <p15:sldGuideLst xmlns="" xmlns:p15="http://schemas.microsoft.com/office/powerpoint/2012/main">
         <p15:guide id="1" orient="horz" pos="3073" userDrawn="1">
           <p15:clr>
             <a:srgbClr val="A4A3A4"/>
@@ -170,7 +170,7 @@
       </p15:sldGuideLst>
     </p:ext>
     <p:ext uri="{2D200454-40CA-4A62-9FC3-DE9A4176ACB9}">
-      <p15:notesGuideLst xmlns:p15="http://schemas.microsoft.com/office/powerpoint/2012/main" xmlns="">
+      <p15:notesGuideLst xmlns="" xmlns:p15="http://schemas.microsoft.com/office/powerpoint/2012/main">
         <p15:guide id="1" orient="horz" pos="2880">
           <p15:clr>
             <a:srgbClr val="A4A3A4"/>
@@ -3012,7 +3012,7 @@
               </a14:hiddenLine>
             </a:ext>
             <a:ext uri="{FAA26D3D-D897-4be2-8F04-BA451C77F1D7}">
-              <ma14:placeholderFlag xmlns:ma14="http://schemas.microsoft.com/office/mac/drawingml/2011/main" xmlns="" val="1"/>
+              <ma14:placeholderFlag xmlns="" xmlns:ma14="http://schemas.microsoft.com/office/mac/drawingml/2011/main" val="1"/>
             </a:ext>
           </a:extLst>
         </p:spPr>
@@ -3073,7 +3073,7 @@
               </a14:hiddenLine>
             </a:ext>
             <a:ext uri="{FAA26D3D-D897-4be2-8F04-BA451C77F1D7}">
-              <ma14:placeholderFlag xmlns:ma14="http://schemas.microsoft.com/office/mac/drawingml/2011/main" xmlns="" val="1"/>
+              <ma14:placeholderFlag xmlns="" xmlns:ma14="http://schemas.microsoft.com/office/mac/drawingml/2011/main" val="1"/>
             </a:ext>
           </a:extLst>
         </p:spPr>
@@ -3752,7 +3752,7 @@
               </a14:hiddenLine>
             </a:ext>
             <a:ext uri="{FAA26D3D-D897-4be2-8F04-BA451C77F1D7}">
-              <ma14:placeholderFlag xmlns:ma14="http://schemas.microsoft.com/office/mac/drawingml/2011/main" xmlns="" val="1"/>
+              <ma14:placeholderFlag xmlns="" xmlns:ma14="http://schemas.microsoft.com/office/mac/drawingml/2011/main" val="1"/>
             </a:ext>
           </a:extLst>
         </p:spPr>
@@ -3813,7 +3813,7 @@
               </a14:hiddenLine>
             </a:ext>
             <a:ext uri="{FAA26D3D-D897-4be2-8F04-BA451C77F1D7}">
-              <ma14:placeholderFlag xmlns:ma14="http://schemas.microsoft.com/office/mac/drawingml/2011/main" xmlns="" val="1"/>
+              <ma14:placeholderFlag xmlns="" xmlns:ma14="http://schemas.microsoft.com/office/mac/drawingml/2011/main" val="1"/>
             </a:ext>
           </a:extLst>
         </p:spPr>
@@ -6707,15 +6707,7 @@
                   <a:srgbClr val="C00000"/>
                 </a:solidFill>
               </a:rPr>
-              <a:t>financial </a:t>
-            </a:r>
-            <a:r>
-              <a:rPr lang="en-US" dirty="0" smtClean="0">
-                <a:solidFill>
-                  <a:srgbClr val="C00000"/>
-                </a:solidFill>
-              </a:rPr>
-              <a:t>sector</a:t>
+              <a:t>financial sector</a:t>
             </a:r>
           </a:p>
         </p:txBody>
@@ -7100,9 +7092,6 @@
               </a:rPr>
               <a:t>Most important features</a:t>
             </a:r>
-            <a:endParaRPr lang="nl-NL" sz="2000" dirty="0" smtClean="0">
-              <a:latin typeface="+mn-lt"/>
-            </a:endParaRPr>
           </a:p>
         </p:txBody>
       </p:sp>
@@ -7165,9 +7154,6 @@
               </a:rPr>
               <a:t> of rooms</a:t>
             </a:r>
-            <a:endParaRPr lang="nl-NL" sz="2000" dirty="0" smtClean="0">
-              <a:latin typeface="+mn-lt"/>
-            </a:endParaRPr>
           </a:p>
         </p:txBody>
       </p:sp>
@@ -7181,13 +7167,13 @@
   <p:clrMapOvr>
     <a:masterClrMapping/>
   </p:clrMapOvr>
-  <mc:AlternateContent xmlns:mc="http://schemas.openxmlformats.org/markup-compatibility/2006">
-    <mc:Choice xmlns:p14="http://schemas.microsoft.com/office/powerpoint/2010/main" Requires="p14">
+  <mc:AlternateContent xmlns:mc="http://schemas.openxmlformats.org/markup-compatibility/2006" xmlns:p14="http://schemas.microsoft.com/office/powerpoint/2010/main">
+    <mc:Choice Requires="p14">
       <p:transition spd="med" p14:dur="700">
         <p:fade/>
       </p:transition>
     </mc:Choice>
-    <mc:Fallback>
+    <mc:Fallback xmlns="">
       <p:transition spd="med">
         <p:fade/>
       </p:transition>
@@ -7265,12 +7251,20 @@
               <a:t>Training data </a:t>
             </a:r>
             <a:r>
+              <a:rPr lang="nl-NL" dirty="0" smtClean="0"/>
+              <a:t>was </a:t>
+            </a:r>
+            <a:r>
               <a:rPr lang="nl-NL" dirty="0" err="1" smtClean="0"/>
               <a:t>supplied</a:t>
             </a:r>
             <a:r>
               <a:rPr lang="nl-NL" dirty="0" smtClean="0"/>
-              <a:t> as </a:t>
+              <a:t> </a:t>
+            </a:r>
+            <a:r>
+              <a:rPr lang="nl-NL" dirty="0" smtClean="0"/>
+              <a:t>as </a:t>
             </a:r>
             <a:r>
               <a:rPr lang="nl-NL" dirty="0" err="1" smtClean="0">
@@ -7418,7 +7412,435 @@
               <a:rPr lang="nl-NL" dirty="0" smtClean="0"/>
               <a:t>data</a:t>
             </a:r>
+          </a:p>
+          <a:p>
+            <a:r>
+              <a:rPr lang="nl-NL" dirty="0" err="1" smtClean="0"/>
+              <a:t>To</a:t>
+            </a:r>
+            <a:r>
+              <a:rPr lang="nl-NL" dirty="0" smtClean="0"/>
+              <a:t> deal </a:t>
+            </a:r>
+            <a:r>
+              <a:rPr lang="nl-NL" dirty="0" err="1" smtClean="0"/>
+              <a:t>with</a:t>
+            </a:r>
+            <a:r>
+              <a:rPr lang="nl-NL" dirty="0" smtClean="0"/>
+              <a:t> missing data, </a:t>
+            </a:r>
+            <a:r>
+              <a:rPr lang="nl-NL" dirty="0" err="1" smtClean="0"/>
+              <a:t>imputing</a:t>
+            </a:r>
+            <a:r>
+              <a:rPr lang="nl-NL" dirty="0" smtClean="0"/>
+              <a:t> data has been </a:t>
+            </a:r>
+            <a:r>
+              <a:rPr lang="nl-NL" dirty="0" err="1" smtClean="0"/>
+              <a:t>tried</a:t>
+            </a:r>
+            <a:r>
+              <a:rPr lang="nl-NL" dirty="0" smtClean="0"/>
+              <a:t> (</a:t>
+            </a:r>
+            <a:r>
+              <a:rPr lang="nl-NL" dirty="0" err="1" smtClean="0"/>
+              <a:t>for</a:t>
+            </a:r>
+            <a:r>
+              <a:rPr lang="nl-NL" dirty="0" smtClean="0"/>
+              <a:t> </a:t>
+            </a:r>
+            <a:r>
+              <a:rPr lang="nl-NL" dirty="0" err="1" smtClean="0"/>
+              <a:t>example</a:t>
+            </a:r>
+            <a:r>
+              <a:rPr lang="nl-NL" dirty="0" smtClean="0"/>
+              <a:t> KNN </a:t>
+            </a:r>
+            <a:r>
+              <a:rPr lang="nl-NL" dirty="0" err="1" smtClean="0"/>
+              <a:t>and</a:t>
+            </a:r>
+            <a:r>
+              <a:rPr lang="nl-NL" dirty="0" smtClean="0"/>
+              <a:t> SVD-</a:t>
+            </a:r>
+            <a:r>
+              <a:rPr lang="nl-NL" dirty="0" err="1" smtClean="0"/>
+              <a:t>based</a:t>
+            </a:r>
+            <a:r>
+              <a:rPr lang="nl-NL" dirty="0" smtClean="0"/>
+              <a:t> </a:t>
+            </a:r>
+            <a:r>
+              <a:rPr lang="nl-NL" dirty="0" err="1" smtClean="0"/>
+              <a:t>methods</a:t>
+            </a:r>
+            <a:r>
+              <a:rPr lang="nl-NL" dirty="0" smtClean="0"/>
+              <a:t>), but </a:t>
+            </a:r>
+            <a:r>
+              <a:rPr lang="nl-NL" dirty="0" err="1" smtClean="0"/>
+              <a:t>were</a:t>
+            </a:r>
+            <a:r>
+              <a:rPr lang="nl-NL" dirty="0" smtClean="0"/>
+              <a:t> </a:t>
+            </a:r>
+            <a:r>
+              <a:rPr lang="nl-NL" dirty="0" err="1" smtClean="0"/>
+              <a:t>ultimately</a:t>
+            </a:r>
+            <a:r>
+              <a:rPr lang="nl-NL" dirty="0" smtClean="0"/>
+              <a:t> </a:t>
+            </a:r>
+            <a:r>
+              <a:rPr lang="nl-NL" dirty="0" err="1" smtClean="0">
+                <a:solidFill>
+                  <a:srgbClr val="C00000"/>
+                </a:solidFill>
+              </a:rPr>
+              <a:t>too</a:t>
+            </a:r>
+            <a:r>
+              <a:rPr lang="nl-NL" dirty="0" smtClean="0">
+                <a:solidFill>
+                  <a:srgbClr val="C00000"/>
+                </a:solidFill>
+              </a:rPr>
+              <a:t> </a:t>
+            </a:r>
+            <a:r>
+              <a:rPr lang="nl-NL" dirty="0" err="1" smtClean="0">
+                <a:solidFill>
+                  <a:srgbClr val="C00000"/>
+                </a:solidFill>
+              </a:rPr>
+              <a:t>costly</a:t>
+            </a:r>
+            <a:r>
+              <a:rPr lang="nl-NL" dirty="0" smtClean="0"/>
+              <a:t> </a:t>
+            </a:r>
+            <a:r>
+              <a:rPr lang="nl-NL" dirty="0" err="1" smtClean="0"/>
+              <a:t>to</a:t>
+            </a:r>
+            <a:r>
+              <a:rPr lang="nl-NL" dirty="0" smtClean="0"/>
+              <a:t> </a:t>
+            </a:r>
+            <a:r>
+              <a:rPr lang="nl-NL" dirty="0" err="1" smtClean="0"/>
+              <a:t>develop</a:t>
+            </a:r>
+            <a:r>
+              <a:rPr lang="nl-NL" dirty="0" smtClean="0"/>
+              <a:t> </a:t>
+            </a:r>
+            <a:r>
+              <a:rPr lang="nl-NL" dirty="0" err="1" smtClean="0"/>
+              <a:t>internally</a:t>
+            </a:r>
             <a:endParaRPr lang="nl-NL" dirty="0" smtClean="0"/>
+          </a:p>
+          <a:p>
+            <a:r>
+              <a:rPr lang="nl-NL" dirty="0" err="1" smtClean="0"/>
+              <a:t>Simpler</a:t>
+            </a:r>
+            <a:r>
+              <a:rPr lang="nl-NL" dirty="0" smtClean="0"/>
+              <a:t> </a:t>
+            </a:r>
+            <a:r>
+              <a:rPr lang="nl-NL" dirty="0" err="1" smtClean="0"/>
+              <a:t>methods</a:t>
+            </a:r>
+            <a:r>
+              <a:rPr lang="nl-NL" dirty="0" smtClean="0"/>
+              <a:t> like </a:t>
+            </a:r>
+            <a:r>
+              <a:rPr lang="nl-NL" dirty="0" err="1" smtClean="0"/>
+              <a:t>using</a:t>
+            </a:r>
+            <a:r>
+              <a:rPr lang="nl-NL" dirty="0" smtClean="0"/>
+              <a:t> </a:t>
+            </a:r>
+            <a:r>
+              <a:rPr lang="nl-NL" dirty="0" err="1" smtClean="0">
+                <a:solidFill>
+                  <a:srgbClr val="C00000"/>
+                </a:solidFill>
+              </a:rPr>
+              <a:t>mean</a:t>
+            </a:r>
+            <a:r>
+              <a:rPr lang="nl-NL" dirty="0" smtClean="0"/>
+              <a:t>, </a:t>
+            </a:r>
+            <a:r>
+              <a:rPr lang="nl-NL" dirty="0" smtClean="0">
+                <a:solidFill>
+                  <a:srgbClr val="C00000"/>
+                </a:solidFill>
+              </a:rPr>
+              <a:t>modus</a:t>
+            </a:r>
+            <a:r>
+              <a:rPr lang="nl-NL" dirty="0" smtClean="0"/>
+              <a:t>, </a:t>
+            </a:r>
+            <a:r>
+              <a:rPr lang="nl-NL" dirty="0" err="1" smtClean="0">
+                <a:solidFill>
+                  <a:srgbClr val="C00000"/>
+                </a:solidFill>
+              </a:rPr>
+              <a:t>median</a:t>
+            </a:r>
+            <a:r>
+              <a:rPr lang="nl-NL" dirty="0" smtClean="0"/>
+              <a:t> </a:t>
+            </a:r>
+            <a:r>
+              <a:rPr lang="nl-NL" dirty="0" err="1" smtClean="0"/>
+              <a:t>offered</a:t>
+            </a:r>
+            <a:r>
+              <a:rPr lang="nl-NL" dirty="0" smtClean="0"/>
+              <a:t> </a:t>
+            </a:r>
+            <a:r>
+              <a:rPr lang="nl-NL" dirty="0" smtClean="0">
+                <a:solidFill>
+                  <a:srgbClr val="C00000"/>
+                </a:solidFill>
+              </a:rPr>
+              <a:t>no </a:t>
+            </a:r>
+            <a:r>
+              <a:rPr lang="nl-NL" dirty="0" err="1" smtClean="0">
+                <a:solidFill>
+                  <a:srgbClr val="C00000"/>
+                </a:solidFill>
+              </a:rPr>
+              <a:t>improvement</a:t>
+            </a:r>
+            <a:r>
+              <a:rPr lang="nl-NL" dirty="0" smtClean="0">
+                <a:solidFill>
+                  <a:srgbClr val="C00000"/>
+                </a:solidFill>
+              </a:rPr>
+              <a:t> </a:t>
+            </a:r>
+            <a:r>
+              <a:rPr lang="nl-NL" dirty="0" smtClean="0"/>
+              <a:t>over </a:t>
+            </a:r>
+            <a:r>
+              <a:rPr lang="nl-NL" dirty="0" err="1" smtClean="0"/>
+              <a:t>not</a:t>
+            </a:r>
+            <a:r>
+              <a:rPr lang="nl-NL" dirty="0" smtClean="0"/>
+              <a:t> </a:t>
+            </a:r>
+            <a:r>
+              <a:rPr lang="nl-NL" dirty="0" err="1" smtClean="0"/>
+              <a:t>replacing</a:t>
+            </a:r>
+            <a:r>
+              <a:rPr lang="nl-NL" dirty="0" smtClean="0"/>
+              <a:t> </a:t>
+            </a:r>
+            <a:r>
+              <a:rPr lang="nl-NL" dirty="0" err="1" smtClean="0"/>
+              <a:t>NaN</a:t>
+            </a:r>
+            <a:r>
+              <a:rPr lang="nl-NL" dirty="0" smtClean="0"/>
+              <a:t> </a:t>
+            </a:r>
+            <a:r>
+              <a:rPr lang="nl-NL" dirty="0" err="1" smtClean="0"/>
+              <a:t>values</a:t>
+            </a:r>
+            <a:endParaRPr lang="nl-NL" dirty="0"/>
+          </a:p>
+          <a:p>
+            <a:r>
+              <a:rPr lang="nl-NL" dirty="0" err="1" smtClean="0"/>
+              <a:t>Not</a:t>
+            </a:r>
+            <a:r>
+              <a:rPr lang="nl-NL" dirty="0" smtClean="0"/>
+              <a:t> </a:t>
+            </a:r>
+            <a:r>
+              <a:rPr lang="nl-NL" dirty="0" err="1" smtClean="0"/>
+              <a:t>replacing</a:t>
+            </a:r>
+            <a:r>
+              <a:rPr lang="nl-NL" dirty="0" smtClean="0"/>
+              <a:t> </a:t>
+            </a:r>
+            <a:r>
+              <a:rPr lang="nl-NL" dirty="0" err="1" smtClean="0"/>
+              <a:t>NaN</a:t>
+            </a:r>
+            <a:r>
+              <a:rPr lang="nl-NL" dirty="0" smtClean="0"/>
+              <a:t> </a:t>
+            </a:r>
+            <a:r>
+              <a:rPr lang="nl-NL" dirty="0" err="1" smtClean="0"/>
+              <a:t>values</a:t>
+            </a:r>
+            <a:r>
+              <a:rPr lang="nl-NL" dirty="0" smtClean="0"/>
+              <a:t> means </a:t>
+            </a:r>
+            <a:r>
+              <a:rPr lang="nl-NL" dirty="0" err="1" smtClean="0"/>
+              <a:t>that</a:t>
+            </a:r>
+            <a:r>
+              <a:rPr lang="nl-NL" dirty="0" smtClean="0"/>
+              <a:t> </a:t>
+            </a:r>
+            <a:r>
+              <a:rPr lang="nl-NL" dirty="0" err="1" smtClean="0"/>
+              <a:t>some</a:t>
+            </a:r>
+            <a:r>
+              <a:rPr lang="nl-NL" dirty="0" smtClean="0"/>
+              <a:t> </a:t>
+            </a:r>
+            <a:r>
+              <a:rPr lang="nl-NL" dirty="0" err="1" smtClean="0"/>
+              <a:t>numerical</a:t>
+            </a:r>
+            <a:r>
+              <a:rPr lang="nl-NL" dirty="0" smtClean="0"/>
+              <a:t> data </a:t>
+            </a:r>
+            <a:r>
+              <a:rPr lang="nl-NL" dirty="0" err="1" smtClean="0">
+                <a:solidFill>
+                  <a:srgbClr val="C00000"/>
+                </a:solidFill>
+              </a:rPr>
+              <a:t>can</a:t>
+            </a:r>
+            <a:r>
+              <a:rPr lang="nl-NL" dirty="0" smtClean="0">
+                <a:solidFill>
+                  <a:srgbClr val="C00000"/>
+                </a:solidFill>
+              </a:rPr>
+              <a:t> </a:t>
+            </a:r>
+            <a:r>
+              <a:rPr lang="nl-NL" dirty="0" err="1" smtClean="0">
+                <a:solidFill>
+                  <a:srgbClr val="C00000"/>
+                </a:solidFill>
+              </a:rPr>
+              <a:t>not</a:t>
+            </a:r>
+            <a:r>
+              <a:rPr lang="nl-NL" dirty="0" smtClean="0">
+                <a:solidFill>
+                  <a:srgbClr val="C00000"/>
+                </a:solidFill>
+              </a:rPr>
+              <a:t> </a:t>
+            </a:r>
+            <a:r>
+              <a:rPr lang="nl-NL" dirty="0" err="1" smtClean="0">
+                <a:solidFill>
+                  <a:srgbClr val="C00000"/>
+                </a:solidFill>
+              </a:rPr>
+              <a:t>be</a:t>
+            </a:r>
+            <a:r>
+              <a:rPr lang="nl-NL" dirty="0" smtClean="0">
+                <a:solidFill>
+                  <a:srgbClr val="C00000"/>
+                </a:solidFill>
+              </a:rPr>
+              <a:t> </a:t>
+            </a:r>
+            <a:r>
+              <a:rPr lang="nl-NL" dirty="0" err="1" smtClean="0">
+                <a:solidFill>
+                  <a:srgbClr val="C00000"/>
+                </a:solidFill>
+              </a:rPr>
+              <a:t>used</a:t>
+            </a:r>
+            <a:r>
+              <a:rPr lang="nl-NL" dirty="0" smtClean="0"/>
+              <a:t>. </a:t>
+            </a:r>
+            <a:r>
+              <a:rPr lang="nl-NL" dirty="0" err="1" smtClean="0"/>
+              <a:t>Categorical</a:t>
+            </a:r>
+            <a:r>
+              <a:rPr lang="nl-NL" dirty="0" smtClean="0"/>
+              <a:t> </a:t>
+            </a:r>
+            <a:r>
+              <a:rPr lang="nl-NL" dirty="0" err="1" smtClean="0"/>
+              <a:t>treats</a:t>
+            </a:r>
+            <a:r>
+              <a:rPr lang="nl-NL" dirty="0" smtClean="0"/>
+              <a:t> </a:t>
+            </a:r>
+            <a:r>
+              <a:rPr lang="nl-NL" dirty="0" err="1" smtClean="0"/>
+              <a:t>NaN</a:t>
+            </a:r>
+            <a:r>
+              <a:rPr lang="nl-NL" dirty="0" smtClean="0"/>
+              <a:t> data as a </a:t>
+            </a:r>
+            <a:r>
+              <a:rPr lang="nl-NL" dirty="0" smtClean="0">
+                <a:solidFill>
+                  <a:srgbClr val="C00000"/>
+                </a:solidFill>
+              </a:rPr>
+              <a:t>separate </a:t>
+            </a:r>
+            <a:r>
+              <a:rPr lang="nl-NL" dirty="0" err="1" smtClean="0">
+                <a:solidFill>
+                  <a:srgbClr val="C00000"/>
+                </a:solidFill>
+              </a:rPr>
+              <a:t>category</a:t>
+            </a:r>
+            <a:endParaRPr lang="nl-NL" dirty="0" smtClean="0">
+              <a:solidFill>
+                <a:srgbClr val="C00000"/>
+              </a:solidFill>
+            </a:endParaRPr>
           </a:p>
         </p:txBody>
       </p:sp>
@@ -7508,81 +7930,25 @@
                   <a:buNone/>
                 </a:pPr>
                 <a:r>
-                  <a:rPr lang="nl-NL" dirty="0" smtClean="0">
+                  <a:rPr lang="en-US" dirty="0" smtClean="0">
                     <a:solidFill>
                       <a:srgbClr val="C00000"/>
                     </a:solidFill>
                   </a:rPr>
-                  <a:t>Root </a:t>
+                  <a:t>Root Mean Squared Logarithmic Error </a:t>
                 </a:r>
                 <a:r>
-                  <a:rPr lang="nl-NL" dirty="0" err="1" smtClean="0">
-                    <a:solidFill>
-                      <a:srgbClr val="C00000"/>
-                    </a:solidFill>
-                  </a:rPr>
-                  <a:t>Mean</a:t>
+                  <a:rPr lang="en-US" dirty="0" smtClean="0"/>
+                  <a:t>(RMSLE)		</a:t>
                 </a:r>
                 <a:r>
-                  <a:rPr lang="nl-NL" dirty="0" smtClean="0">
-                    <a:solidFill>
-                      <a:srgbClr val="C00000"/>
-                    </a:solidFill>
-                  </a:rPr>
+                  <a:rPr lang="en-US" dirty="0" smtClean="0"/>
                   <a:t> </a:t>
-                </a:r>
-                <a:r>
-                  <a:rPr lang="nl-NL" dirty="0" err="1" smtClean="0">
-                    <a:solidFill>
-                      <a:srgbClr val="C00000"/>
-                    </a:solidFill>
-                  </a:rPr>
-                  <a:t>Squared</a:t>
-                </a:r>
-                <a:r>
-                  <a:rPr lang="nl-NL" dirty="0" smtClean="0">
-                    <a:solidFill>
-                      <a:srgbClr val="C00000"/>
-                    </a:solidFill>
-                  </a:rPr>
-                  <a:t> </a:t>
-                </a:r>
-                <a:r>
-                  <a:rPr lang="nl-NL" dirty="0" err="1" smtClean="0">
-                    <a:solidFill>
-                      <a:srgbClr val="C00000"/>
-                    </a:solidFill>
-                  </a:rPr>
-                  <a:t>Logarithmic</a:t>
-                </a:r>
-                <a:r>
-                  <a:rPr lang="nl-NL" dirty="0" smtClean="0">
-                    <a:solidFill>
-                      <a:srgbClr val="C00000"/>
-                    </a:solidFill>
-                  </a:rPr>
-                  <a:t> </a:t>
-                </a:r>
-                <a:r>
-                  <a:rPr lang="nl-NL" dirty="0" smtClean="0">
-                    <a:solidFill>
-                      <a:srgbClr val="C00000"/>
-                    </a:solidFill>
-                  </a:rPr>
-                  <a:t>Error </a:t>
-                </a:r>
-                <a:r>
-                  <a:rPr lang="nl-NL" dirty="0" smtClean="0"/>
-                  <a:t>(RMSLE)</a:t>
-                </a:r>
-                <a:r>
-                  <a:rPr lang="nl-NL" dirty="0" smtClean="0"/>
-                  <a:t>		 </a:t>
                 </a:r>
                 <a14:m>
                   <m:oMath xmlns:m="http://schemas.openxmlformats.org/officeDocument/2006/math">
                     <m:r>
-                      <a:rPr lang="nl-NL">
+                      <a:rPr lang="en-US">
                         <a:latin typeface="Cambria Math"/>
                       </a:rPr>
                       <m:t>	</m:t>
@@ -7591,7 +7957,7 @@
                       <m:radPr>
                         <m:degHide m:val="on"/>
                         <m:ctrlPr>
-                          <a:rPr lang="nl-NL" i="1" smtClean="0">
+                          <a:rPr lang="en-US" i="1" smtClean="0">
                             <a:latin typeface="Cambria Math"/>
                           </a:rPr>
                         </m:ctrlPr>
@@ -7601,14 +7967,14 @@
                         <m:f>
                           <m:fPr>
                             <m:ctrlPr>
-                              <a:rPr lang="nl-NL" i="1" smtClean="0">
+                              <a:rPr lang="en-US" i="1" smtClean="0">
                                 <a:latin typeface="Cambria Math"/>
                               </a:rPr>
                             </m:ctrlPr>
                           </m:fPr>
                           <m:num>
                             <m:r>
-                              <a:rPr lang="nl-NL" b="0" i="1" smtClean="0">
+                              <a:rPr lang="en-US" b="0" i="1" smtClean="0">
                                 <a:latin typeface="Cambria Math"/>
                               </a:rPr>
                               <m:t>1</m:t>
@@ -7616,7 +7982,7 @@
                           </m:num>
                           <m:den>
                             <m:r>
-                              <a:rPr lang="nl-NL" b="0" i="1" smtClean="0">
+                              <a:rPr lang="en-US" b="0" i="1" smtClean="0">
                                 <a:latin typeface="Cambria Math"/>
                               </a:rPr>
                               <m:t>𝑛</m:t>
@@ -7627,7 +7993,7 @@
                           <m:naryPr>
                             <m:chr m:val="∑"/>
                             <m:ctrlPr>
-                              <a:rPr lang="nl-NL" i="1" smtClean="0">
+                              <a:rPr lang="en-US" i="1" smtClean="0">
                                 <a:latin typeface="Cambria Math"/>
                               </a:rPr>
                             </m:ctrlPr>
@@ -7637,13 +8003,13 @@
                               <m:rPr>
                                 <m:brk m:alnAt="23"/>
                               </m:rPr>
-                              <a:rPr lang="nl-NL" b="0" i="1" smtClean="0">
+                              <a:rPr lang="en-US" b="0" i="1" smtClean="0">
                                 <a:latin typeface="Cambria Math"/>
                               </a:rPr>
                               <m:t>𝑖</m:t>
                             </m:r>
                             <m:r>
-                              <a:rPr lang="nl-NL" b="0" i="1" smtClean="0">
+                              <a:rPr lang="en-US" b="0" i="1" smtClean="0">
                                 <a:latin typeface="Cambria Math"/>
                               </a:rPr>
                               <m:t>=1</m:t>
@@ -7651,7 +8017,7 @@
                           </m:sub>
                           <m:sup>
                             <m:r>
-                              <a:rPr lang="nl-NL" b="0" i="1" smtClean="0">
+                              <a:rPr lang="en-US" b="0" i="1" smtClean="0">
                                 <a:latin typeface="Cambria Math"/>
                               </a:rPr>
                               <m:t>𝑛</m:t>
@@ -7661,14 +8027,14 @@
                             <m:sSup>
                               <m:sSupPr>
                                 <m:ctrlPr>
-                                  <a:rPr lang="nl-NL" b="0" i="1" smtClean="0">
+                                  <a:rPr lang="en-US" b="0" i="1" smtClean="0">
                                     <a:latin typeface="Cambria Math"/>
                                   </a:rPr>
                                 </m:ctrlPr>
                               </m:sSupPr>
                               <m:e>
                                 <m:r>
-                                  <a:rPr lang="nl-NL" i="1">
+                                  <a:rPr lang="en-US" i="1">
                                     <a:latin typeface="Cambria Math"/>
                                   </a:rPr>
                                   <m:t>(</m:t>
@@ -7676,7 +8042,7 @@
                                 <m:func>
                                   <m:funcPr>
                                     <m:ctrlPr>
-                                      <a:rPr lang="nl-NL" i="1">
+                                      <a:rPr lang="en-US" i="1">
                                         <a:latin typeface="Cambria Math"/>
                                       </a:rPr>
                                     </m:ctrlPr>
@@ -7686,7 +8052,7 @@
                                       <m:rPr>
                                         <m:sty m:val="p"/>
                                       </m:rPr>
-                                      <a:rPr lang="nl-NL">
+                                      <a:rPr lang="en-US">
                                         <a:latin typeface="Cambria Math"/>
                                       </a:rPr>
                                       <m:t>log</m:t>
@@ -7696,14 +8062,14 @@
                                     <m:sSub>
                                       <m:sSubPr>
                                         <m:ctrlPr>
-                                          <a:rPr lang="nl-NL" i="1">
+                                          <a:rPr lang="en-US" i="1">
                                             <a:latin typeface="Cambria Math"/>
                                           </a:rPr>
                                         </m:ctrlPr>
                                       </m:sSubPr>
                                       <m:e>
                                         <m:r>
-                                          <a:rPr lang="nl-NL" i="1">
+                                          <a:rPr lang="en-US" i="1">
                                             <a:latin typeface="Cambria Math"/>
                                           </a:rPr>
                                           <m:t>𝑦</m:t>
@@ -7711,7 +8077,7 @@
                                       </m:e>
                                       <m:sub>
                                         <m:r>
-                                          <a:rPr lang="nl-NL" i="1">
+                                          <a:rPr lang="en-US" i="1">
                                             <a:latin typeface="Cambria Math"/>
                                           </a:rPr>
                                           <m:t>𝑖</m:t>
@@ -7721,7 +8087,7 @@
                                   </m:e>
                                 </m:func>
                                 <m:r>
-                                  <a:rPr lang="nl-NL" i="1">
+                                  <a:rPr lang="en-US" i="1">
                                     <a:latin typeface="Cambria Math"/>
                                   </a:rPr>
                                   <m:t>−</m:t>
@@ -7729,7 +8095,7 @@
                                 <m:func>
                                   <m:funcPr>
                                     <m:ctrlPr>
-                                      <a:rPr lang="nl-NL" i="1">
+                                      <a:rPr lang="en-US" i="1">
                                         <a:latin typeface="Cambria Math"/>
                                       </a:rPr>
                                     </m:ctrlPr>
@@ -7739,7 +8105,7 @@
                                       <m:rPr>
                                         <m:sty m:val="p"/>
                                       </m:rPr>
-                                      <a:rPr lang="nl-NL">
+                                      <a:rPr lang="en-US">
                                         <a:latin typeface="Cambria Math"/>
                                       </a:rPr>
                                       <m:t>log</m:t>
@@ -7749,7 +8115,7 @@
                                     <m:sSub>
                                       <m:sSubPr>
                                         <m:ctrlPr>
-                                          <a:rPr lang="nl-NL" i="1">
+                                          <a:rPr lang="en-US" i="1">
                                             <a:latin typeface="Cambria Math"/>
                                           </a:rPr>
                                         </m:ctrlPr>
@@ -7759,14 +8125,14 @@
                                           <m:accPr>
                                             <m:chr m:val="̂"/>
                                             <m:ctrlPr>
-                                              <a:rPr lang="nl-NL" i="1">
+                                              <a:rPr lang="en-US" i="1">
                                                 <a:latin typeface="Cambria Math"/>
                                               </a:rPr>
                                             </m:ctrlPr>
                                           </m:accPr>
                                           <m:e>
                                             <m:r>
-                                              <a:rPr lang="nl-NL" i="1">
+                                              <a:rPr lang="en-US" i="1">
                                                 <a:latin typeface="Cambria Math"/>
                                               </a:rPr>
                                               <m:t>𝑦</m:t>
@@ -7776,7 +8142,7 @@
                                       </m:e>
                                       <m:sub>
                                         <m:r>
-                                          <a:rPr lang="nl-NL" i="1">
+                                          <a:rPr lang="en-US" i="1">
                                             <a:latin typeface="Cambria Math"/>
                                           </a:rPr>
                                           <m:t>𝑖</m:t>
@@ -7786,7 +8152,7 @@
                                   </m:e>
                                 </m:func>
                                 <m:r>
-                                  <a:rPr lang="nl-NL" i="1">
+                                  <a:rPr lang="en-US" i="1">
                                     <a:latin typeface="Cambria Math"/>
                                   </a:rPr>
                                   <m:t>)</m:t>
@@ -7794,7 +8160,7 @@
                               </m:e>
                               <m:sup>
                                 <m:r>
-                                  <a:rPr lang="nl-NL" b="0" i="1" smtClean="0">
+                                  <a:rPr lang="en-US" b="0" i="1" smtClean="0">
                                     <a:latin typeface="Cambria Math"/>
                                   </a:rPr>
                                   <m:t>2</m:t>
@@ -7807,58 +8173,30 @@
                     </m:rad>
                   </m:oMath>
                 </a14:m>
-                <a:endParaRPr lang="nl-NL" dirty="0" smtClean="0"/>
+                <a:endParaRPr lang="en-US" dirty="0" smtClean="0"/>
               </a:p>
               <a:p>
                 <a:pPr marL="0" indent="0">
                   <a:buNone/>
                 </a:pPr>
                 <a:r>
-                  <a:rPr lang="nl-NL" dirty="0" smtClean="0"/>
-                  <a:t>Split </a:t>
+                  <a:rPr lang="en-US" dirty="0" smtClean="0"/>
+                  <a:t>Split the train data between data </a:t>
                 </a:r>
                 <a:r>
-                  <a:rPr lang="nl-NL" dirty="0" err="1" smtClean="0"/>
-                  <a:t>the</a:t>
-                </a:r>
-                <a:r>
-                  <a:rPr lang="nl-NL" dirty="0" smtClean="0"/>
-                  <a:t> train data </a:t>
-                </a:r>
-                <a:r>
-                  <a:rPr lang="nl-NL" dirty="0" err="1" smtClean="0"/>
-                  <a:t>between</a:t>
-                </a:r>
-                <a:r>
-                  <a:rPr lang="nl-NL" dirty="0" smtClean="0"/>
-                  <a:t> data </a:t>
-                </a:r>
-                <a:r>
-                  <a:rPr lang="nl-NL" dirty="0" err="1" smtClean="0">
+                  <a:rPr lang="en-US" dirty="0" smtClean="0">
                     <a:solidFill>
                       <a:srgbClr val="C00000"/>
                     </a:solidFill>
                   </a:rPr>
-                  <a:t>before</a:t>
+                  <a:t>before 2015 </a:t>
                 </a:r>
                 <a:r>
-                  <a:rPr lang="nl-NL" dirty="0" smtClean="0">
-                    <a:solidFill>
-                      <a:srgbClr val="C00000"/>
-                    </a:solidFill>
-                  </a:rPr>
-                  <a:t> 2015 </a:t>
+                  <a:rPr lang="en-US" dirty="0" smtClean="0"/>
+                  <a:t>and </a:t>
                 </a:r>
                 <a:r>
-                  <a:rPr lang="nl-NL" dirty="0" err="1" smtClean="0"/>
-                  <a:t>and</a:t>
-                </a:r>
-                <a:r>
-                  <a:rPr lang="nl-NL" dirty="0" smtClean="0"/>
-                  <a:t> </a:t>
-                </a:r>
-                <a:r>
-                  <a:rPr lang="nl-NL" dirty="0" smtClean="0">
+                  <a:rPr lang="en-US" dirty="0" smtClean="0">
                     <a:solidFill>
                       <a:srgbClr val="C00000"/>
                     </a:solidFill>
@@ -7866,30 +8204,96 @@
                   <a:t>in 2015</a:t>
                 </a:r>
                 <a:r>
-                  <a:rPr lang="nl-NL" dirty="0" smtClean="0"/>
-                  <a:t>, </a:t>
+                  <a:rPr lang="en-US" dirty="0" smtClean="0"/>
+                  <a:t>, for internal </a:t>
                 </a:r>
                 <a:r>
-                  <a:rPr lang="nl-NL" dirty="0" err="1" smtClean="0"/>
-                  <a:t>for</a:t>
+                  <a:rPr lang="en-US" dirty="0" smtClean="0"/>
+                  <a:t>validation</a:t>
+                </a:r>
+              </a:p>
+              <a:p>
+                <a:pPr marL="0" indent="0">
+                  <a:buNone/>
+                </a:pPr>
+                <a:endParaRPr lang="en-US" dirty="0" smtClean="0"/>
+              </a:p>
+              <a:p>
+                <a:pPr marL="0" indent="0">
+                  <a:buNone/>
+                </a:pPr>
+                <a:r>
+                  <a:rPr lang="en-US" dirty="0" smtClean="0">
+                    <a:solidFill>
+                      <a:srgbClr val="C00000"/>
+                    </a:solidFill>
+                  </a:rPr>
+                  <a:t>Little correlation </a:t>
                 </a:r>
                 <a:r>
-                  <a:rPr lang="nl-NL" dirty="0" smtClean="0"/>
-                  <a:t> </a:t>
+                  <a:rPr lang="en-US" dirty="0" smtClean="0"/>
+                  <a:t>with validation used by </a:t>
                 </a:r>
                 <a:r>
-                  <a:rPr lang="nl-NL" dirty="0" err="1" smtClean="0"/>
-                  <a:t>internal</a:t>
+                  <a:rPr lang="en-US" dirty="0" err="1" smtClean="0"/>
+                  <a:t>Kaggle</a:t>
                 </a:r>
                 <a:r>
-                  <a:rPr lang="nl-NL" dirty="0" smtClean="0"/>
-                  <a:t> </a:t>
+                  <a:rPr lang="en-US" dirty="0" smtClean="0"/>
+                  <a:t> submissions</a:t>
+                </a:r>
+                <a:endParaRPr lang="en-US" dirty="0"/>
+              </a:p>
+              <a:p>
+                <a:pPr marL="0" indent="0">
+                  <a:buNone/>
+                </a:pPr>
+                <a:r>
+                  <a:rPr lang="en-US" dirty="0" smtClean="0"/>
+                  <a:t>Possibly </a:t>
                 </a:r>
                 <a:r>
-                  <a:rPr lang="nl-NL" dirty="0" err="1" smtClean="0"/>
-                  <a:t>validation</a:t>
+                  <a:rPr lang="en-US" dirty="0" smtClean="0">
+                    <a:solidFill>
+                      <a:srgbClr val="C00000"/>
+                    </a:solidFill>
+                  </a:rPr>
+                  <a:t>fraud</a:t>
                 </a:r>
-                <a:endParaRPr lang="nl-NL" dirty="0" smtClean="0"/>
+                <a:r>
+                  <a:rPr lang="en-US" dirty="0" smtClean="0"/>
+                  <a:t> in data, or </a:t>
+                </a:r>
+                <a:r>
+                  <a:rPr lang="en-US" dirty="0" smtClean="0">
+                    <a:solidFill>
+                      <a:srgbClr val="C00000"/>
+                    </a:solidFill>
+                  </a:rPr>
+                  <a:t>discrepancies</a:t>
+                </a:r>
+                <a:r>
+                  <a:rPr lang="en-US" dirty="0" smtClean="0"/>
+                  <a:t> in the time-price                                                                   trend correction</a:t>
+                </a:r>
+              </a:p>
+              <a:p>
+                <a:pPr marL="0" indent="0">
+                  <a:buNone/>
+                </a:pPr>
+                <a:r>
+                  <a:rPr lang="en-US" smtClean="0"/>
+                  <a:t>Result: usefulness </a:t>
+                </a:r>
+                <a:r>
+                  <a:rPr lang="en-US" dirty="0" smtClean="0"/>
+                  <a:t>of validation </a:t>
+                </a:r>
+                <a:r>
+                  <a:rPr lang="en-US" smtClean="0"/>
+                  <a:t>greatly decreased</a:t>
+                </a:r>
+                <a:endParaRPr lang="en-US" dirty="0" smtClean="0"/>
               </a:p>
             </p:txBody>
           </p:sp>
@@ -7951,8 +8355,8 @@
         </p:blipFill>
         <p:spPr bwMode="auto">
           <a:xfrm>
-            <a:off x="5218150" y="3848100"/>
-            <a:ext cx="6911901" cy="4657725"/>
+            <a:off x="10676199" y="4838700"/>
+            <a:ext cx="5413616" cy="3648075"/>
           </a:xfrm>
           <a:prstGeom prst="rect">
             <a:avLst/>
@@ -8076,7 +8480,7 @@
         </p:spPr>
         <p:txBody>
           <a:bodyPr>
-            <a:normAutofit fontScale="92500" lnSpcReduction="20000"/>
+            <a:normAutofit lnSpcReduction="10000"/>
           </a:bodyPr>
           <a:lstStyle/>
           <a:p>
@@ -8178,11 +8582,7 @@
             </a:pPr>
             <a:r>
               <a:rPr lang="en-US" sz="2200" dirty="0" smtClean="0"/>
-              <a:t>Deep </a:t>
-            </a:r>
-            <a:r>
-              <a:rPr lang="en-US" sz="2200" dirty="0" smtClean="0"/>
-              <a:t>Learning (</a:t>
+              <a:t>Deep Learning (</a:t>
             </a:r>
             <a:r>
               <a:rPr lang="en-US" sz="2200" dirty="0" err="1" smtClean="0"/>
@@ -8230,98 +8630,96 @@
               <a:rPr lang="nl-NL" dirty="0" smtClean="0"/>
               <a:t>)</a:t>
             </a:r>
-            <a:endParaRPr lang="nl-NL" u="sng" dirty="0" smtClean="0"/>
+            <a:endParaRPr lang="nl-NL" dirty="0" smtClean="0"/>
           </a:p>
           <a:p>
             <a:pPr marL="0" indent="0">
               <a:buNone/>
             </a:pPr>
+            <a:r>
+              <a:rPr lang="nl-NL" dirty="0" err="1" smtClean="0"/>
+              <a:t>Methods</a:t>
+            </a:r>
+            <a:r>
+              <a:rPr lang="nl-NL" dirty="0" smtClean="0"/>
+              <a:t> are easy </a:t>
+            </a:r>
+            <a:r>
+              <a:rPr lang="nl-NL" dirty="0" err="1" smtClean="0"/>
+              <a:t>to</a:t>
+            </a:r>
+            <a:r>
+              <a:rPr lang="nl-NL" dirty="0" smtClean="0"/>
+              <a:t> </a:t>
+            </a:r>
+            <a:r>
+              <a:rPr lang="nl-NL" dirty="0" err="1" smtClean="0"/>
+              <a:t>use</a:t>
+            </a:r>
+            <a:r>
+              <a:rPr lang="nl-NL" dirty="0" smtClean="0"/>
+              <a:t>, </a:t>
+            </a:r>
+            <a:r>
+              <a:rPr lang="nl-NL" dirty="0" err="1" smtClean="0"/>
+              <a:t>readily</a:t>
+            </a:r>
+            <a:r>
+              <a:rPr lang="nl-NL" dirty="0" smtClean="0"/>
+              <a:t> </a:t>
+            </a:r>
+            <a:r>
+              <a:rPr lang="nl-NL" dirty="0" err="1" smtClean="0"/>
+              <a:t>available</a:t>
+            </a:r>
+            <a:r>
+              <a:rPr lang="nl-NL" dirty="0" smtClean="0"/>
+              <a:t>, </a:t>
+            </a:r>
+            <a:r>
+              <a:rPr lang="nl-NL" dirty="0" err="1" smtClean="0"/>
+              <a:t>and</a:t>
+            </a:r>
+            <a:r>
+              <a:rPr lang="nl-NL" dirty="0" smtClean="0"/>
+              <a:t> proven </a:t>
+            </a:r>
+            <a:r>
+              <a:rPr lang="nl-NL" dirty="0" err="1" smtClean="0"/>
+              <a:t>to</a:t>
+            </a:r>
+            <a:r>
+              <a:rPr lang="nl-NL" dirty="0" smtClean="0"/>
+              <a:t> </a:t>
+            </a:r>
+            <a:r>
+              <a:rPr lang="nl-NL" dirty="0" err="1" smtClean="0"/>
+              <a:t>work</a:t>
+            </a:r>
+            <a:r>
+              <a:rPr lang="nl-NL" dirty="0" smtClean="0"/>
+              <a:t> </a:t>
+            </a:r>
+            <a:r>
+              <a:rPr lang="nl-NL" dirty="0" err="1" smtClean="0"/>
+              <a:t>decently</a:t>
+            </a:r>
             <a:endParaRPr lang="nl-NL" dirty="0" smtClean="0"/>
           </a:p>
           <a:p>
             <a:pPr marL="0" indent="0">
               <a:buNone/>
             </a:pPr>
-            <a:r>
-              <a:rPr lang="nl-NL" dirty="0" err="1" smtClean="0"/>
-              <a:t>Methods</a:t>
-            </a:r>
-            <a:r>
-              <a:rPr lang="nl-NL" dirty="0" smtClean="0"/>
-              <a:t> are easy </a:t>
-            </a:r>
-            <a:r>
-              <a:rPr lang="nl-NL" dirty="0" err="1" smtClean="0"/>
-              <a:t>to</a:t>
-            </a:r>
-            <a:r>
-              <a:rPr lang="nl-NL" dirty="0" smtClean="0"/>
-              <a:t> </a:t>
-            </a:r>
-            <a:r>
-              <a:rPr lang="nl-NL" dirty="0" err="1" smtClean="0"/>
-              <a:t>use</a:t>
-            </a:r>
-            <a:r>
-              <a:rPr lang="nl-NL" dirty="0" smtClean="0"/>
-              <a:t>, </a:t>
-            </a:r>
-            <a:r>
-              <a:rPr lang="nl-NL" dirty="0" err="1" smtClean="0"/>
-              <a:t>readily</a:t>
-            </a:r>
-            <a:r>
-              <a:rPr lang="nl-NL" dirty="0" smtClean="0"/>
-              <a:t> </a:t>
-            </a:r>
-            <a:r>
-              <a:rPr lang="nl-NL" dirty="0" err="1" smtClean="0"/>
-              <a:t>available</a:t>
-            </a:r>
-            <a:r>
-              <a:rPr lang="nl-NL" dirty="0" smtClean="0"/>
-              <a:t>, </a:t>
-            </a:r>
-            <a:r>
-              <a:rPr lang="nl-NL" dirty="0" err="1" smtClean="0"/>
-              <a:t>and</a:t>
-            </a:r>
-            <a:r>
-              <a:rPr lang="nl-NL" dirty="0" smtClean="0"/>
-              <a:t> proven </a:t>
-            </a:r>
-            <a:r>
-              <a:rPr lang="nl-NL" dirty="0" err="1" smtClean="0"/>
-              <a:t>to</a:t>
-            </a:r>
-            <a:r>
-              <a:rPr lang="nl-NL" dirty="0" smtClean="0"/>
-              <a:t> </a:t>
-            </a:r>
-            <a:r>
-              <a:rPr lang="nl-NL" dirty="0" err="1" smtClean="0"/>
-              <a:t>work</a:t>
-            </a:r>
-            <a:r>
-              <a:rPr lang="nl-NL" dirty="0" smtClean="0"/>
-              <a:t> </a:t>
-            </a:r>
-            <a:r>
-              <a:rPr lang="nl-NL" dirty="0" err="1" smtClean="0"/>
-              <a:t>decently</a:t>
-            </a:r>
-            <a:endParaRPr lang="nl-NL" dirty="0" smtClean="0"/>
+            <a:endParaRPr lang="nl-NL" dirty="0" smtClean="0">
+              <a:solidFill>
+                <a:srgbClr val="C00000"/>
+              </a:solidFill>
+            </a:endParaRPr>
           </a:p>
           <a:p>
             <a:pPr marL="0" indent="0">
               <a:buNone/>
             </a:pPr>
-            <a:endParaRPr lang="nl-NL" dirty="0"/>
-          </a:p>
-          <a:p>
-            <a:pPr marL="0" indent="0">
-              <a:buNone/>
-            </a:pPr>
             <a:r>
               <a:rPr lang="nl-NL" dirty="0" err="1" smtClean="0">
                 <a:solidFill>
@@ -8376,7 +8774,11 @@
             </a:r>
             <a:r>
               <a:rPr lang="nl-NL" dirty="0" smtClean="0"/>
-              <a:t> later </a:t>
+              <a:t> </a:t>
+            </a:r>
+            <a:r>
+              <a:rPr lang="nl-NL" dirty="0" smtClean="0"/>
+              <a:t>later </a:t>
             </a:r>
             <a:r>
               <a:rPr lang="nl-NL" dirty="0" err="1" smtClean="0"/>
@@ -14857,7 +15259,7 @@
   <a:extraClrSchemeLst/>
   <a:extLst>
     <a:ext uri="{05A4C25C-085E-4340-85A3-A5531E510DB2}">
-      <thm15:themeFamily xmlns:thm15="http://schemas.microsoft.com/office/thememl/2012/main" xmlns="" name="RU_PPT_ENG_CP" id="{A2B2A2E5-8C10-3D48-B879-97090C454E52}" vid="{FD09F00C-FDC6-E347-A03D-C9781C1DC58D}"/>
+      <thm15:themeFamily xmlns="" xmlns:thm15="http://schemas.microsoft.com/office/thememl/2012/main" name="RU_PPT_ENG_CP" id="{A2B2A2E5-8C10-3D48-B879-97090C454E52}" vid="{FD09F00C-FDC6-E347-A03D-C9781C1DC58D}"/>
     </a:ext>
   </a:extLst>
 </a:theme>
@@ -15197,7 +15599,7 @@
   <a:extraClrSchemeLst/>
   <a:extLst>
     <a:ext uri="{05A4C25C-085E-4340-85A3-A5531E510DB2}">
-      <thm15:themeFamily xmlns:thm15="http://schemas.microsoft.com/office/thememl/2012/main" xmlns="" name="RU_PPT_ENG_CP" id="{A2B2A2E5-8C10-3D48-B879-97090C454E52}" vid="{7DEE8FA5-744F-DF47-8956-AA68E72134BF}"/>
+      <thm15:themeFamily xmlns="" xmlns:thm15="http://schemas.microsoft.com/office/thememl/2012/main" name="RU_PPT_ENG_CP" id="{A2B2A2E5-8C10-3D48-B879-97090C454E52}" vid="{7DEE8FA5-744F-DF47-8956-AA68E72134BF}"/>
     </a:ext>
   </a:extLst>
 </a:theme>

</xml_diff>

<commit_message>
Probably the final version
</commit_message>
<xml_diff>
--- a/presentatie/Classified_MLiP_final_presentation_2.pptx
+++ b/presentatie/Classified_MLiP_final_presentation_2.pptx
@@ -292,7 +292,7 @@
             <a:fld id="{17A39E9D-B438-D94D-AF2A-93757548558C}" type="datetime1">
               <a:rPr lang="nl-NL" altLang="nl-NL"/>
               <a:pPr/>
-              <a:t>20-6-2017</a:t>
+              <a:t>21-6-2017</a:t>
             </a:fld>
             <a:endParaRPr lang="nl-NL" altLang="nl-NL"/>
           </a:p>
@@ -504,7 +504,7 @@
             <a:fld id="{3AA95554-0BC3-EC48-BCE0-DB850053191D}" type="datetime1">
               <a:rPr lang="nl-NL" altLang="nl-NL"/>
               <a:pPr/>
-              <a:t>20-6-2017</a:t>
+              <a:t>21-6-2017</a:t>
             </a:fld>
             <a:endParaRPr lang="nl-NL" altLang="nl-NL"/>
           </a:p>
@@ -1218,7 +1218,7 @@
           <a:p>
             <a:fld id="{9E1ED08B-741D-9E48-95DA-82644AB503BC}" type="datetime1">
               <a:rPr lang="nl-NL" altLang="nl-NL" smtClean="0"/>
-              <a:t>20-6-2017</a:t>
+              <a:t>21-6-2017</a:t>
             </a:fld>
             <a:endParaRPr lang="nl-NL" altLang="nl-NL"/>
           </a:p>
@@ -1589,7 +1589,7 @@
             <a:fld id="{9E1ED08B-741D-9E48-95DA-82644AB503BC}" type="datetime1">
               <a:rPr lang="nl-NL" altLang="nl-NL" smtClean="0"/>
               <a:pPr/>
-              <a:t>20-6-2017</a:t>
+              <a:t>21-6-2017</a:t>
             </a:fld>
             <a:endParaRPr lang="nl-NL" altLang="nl-NL" dirty="0"/>
           </a:p>
@@ -1878,7 +1878,7 @@
           <a:p>
             <a:fld id="{418C17E9-359A-1148-9DEA-7F27ED0F3E46}" type="datetime1">
               <a:rPr lang="nl-NL" altLang="nl-NL" smtClean="0"/>
-              <a:t>20-6-2017</a:t>
+              <a:t>21-6-2017</a:t>
             </a:fld>
             <a:endParaRPr lang="nl-NL" altLang="nl-NL"/>
           </a:p>
@@ -2094,7 +2094,7 @@
           <a:p>
             <a:fld id="{46CB0545-8C00-A544-A88F-C33FBC7A7630}" type="datetime1">
               <a:rPr lang="nl-NL" altLang="nl-NL" smtClean="0"/>
-              <a:t>20-6-2017</a:t>
+              <a:t>21-6-2017</a:t>
             </a:fld>
             <a:endParaRPr lang="nl-NL" altLang="nl-NL" dirty="0"/>
           </a:p>
@@ -2464,7 +2464,7 @@
           <a:p>
             <a:fld id="{46CB0545-8C00-A544-A88F-C33FBC7A7630}" type="datetime1">
               <a:rPr lang="nl-NL" altLang="nl-NL" smtClean="0"/>
-              <a:t>20-6-2017</a:t>
+              <a:t>21-6-2017</a:t>
             </a:fld>
             <a:endParaRPr lang="nl-NL" altLang="nl-NL" dirty="0"/>
           </a:p>
@@ -2857,7 +2857,7 @@
             <a:fld id="{9E1ED08B-741D-9E48-95DA-82644AB503BC}" type="datetime1">
               <a:rPr lang="nl-NL" altLang="nl-NL" smtClean="0"/>
               <a:pPr/>
-              <a:t>20-6-2017</a:t>
+              <a:t>21-6-2017</a:t>
             </a:fld>
             <a:endParaRPr lang="nl-NL" altLang="nl-NL" dirty="0"/>
           </a:p>
@@ -3253,7 +3253,7 @@
             <a:fld id="{B3873A8C-A209-FC40-86BC-D3E9A671FD81}" type="datetime1">
               <a:rPr lang="nl-NL" altLang="nl-NL" smtClean="0"/>
               <a:pPr/>
-              <a:t>20-6-2017</a:t>
+              <a:t>21-6-2017</a:t>
             </a:fld>
             <a:endParaRPr lang="nl-NL" altLang="nl-NL" dirty="0"/>
           </a:p>
@@ -3994,7 +3994,7 @@
             <a:fld id="{FB5CF2AB-20FF-5442-9E53-3C6EDD7FBCEA}" type="datetime1">
               <a:rPr lang="nl-NL" altLang="nl-NL" smtClean="0"/>
               <a:pPr/>
-              <a:t>20-6-2017</a:t>
+              <a:t>21-6-2017</a:t>
             </a:fld>
             <a:endParaRPr lang="nl-NL" altLang="nl-NL" dirty="0"/>
           </a:p>
@@ -7248,11 +7248,7 @@
           <a:p>
             <a:r>
               <a:rPr lang="nl-NL" dirty="0" smtClean="0"/>
-              <a:t>Training data </a:t>
-            </a:r>
-            <a:r>
-              <a:rPr lang="nl-NL" dirty="0" smtClean="0"/>
-              <a:t>was </a:t>
+              <a:t>Training data was </a:t>
             </a:r>
             <a:r>
               <a:rPr lang="nl-NL" dirty="0" err="1" smtClean="0"/>
@@ -7260,11 +7256,7 @@
             </a:r>
             <a:r>
               <a:rPr lang="nl-NL" dirty="0" smtClean="0"/>
-              <a:t> </a:t>
-            </a:r>
-            <a:r>
-              <a:rPr lang="nl-NL" dirty="0" smtClean="0"/>
-              <a:t>as </a:t>
+              <a:t> as </a:t>
             </a:r>
             <a:r>
               <a:rPr lang="nl-NL" dirty="0" err="1" smtClean="0">
@@ -7406,11 +7398,7 @@
             </a:r>
             <a:r>
               <a:rPr lang="nl-NL" dirty="0" smtClean="0"/>
-              <a:t> </a:t>
-            </a:r>
-            <a:r>
-              <a:rPr lang="nl-NL" dirty="0" smtClean="0"/>
-              <a:t>data</a:t>
+              <a:t> data</a:t>
             </a:r>
           </a:p>
           <a:p>
@@ -7677,170 +7665,7 @@
               <a:rPr lang="nl-NL" dirty="0" err="1" smtClean="0"/>
               <a:t>values</a:t>
             </a:r>
-            <a:endParaRPr lang="nl-NL" dirty="0"/>
-          </a:p>
-          <a:p>
-            <a:r>
-              <a:rPr lang="nl-NL" dirty="0" err="1" smtClean="0"/>
-              <a:t>Not</a:t>
-            </a:r>
-            <a:r>
-              <a:rPr lang="nl-NL" dirty="0" smtClean="0"/>
-              <a:t> </a:t>
-            </a:r>
-            <a:r>
-              <a:rPr lang="nl-NL" dirty="0" err="1" smtClean="0"/>
-              <a:t>replacing</a:t>
-            </a:r>
-            <a:r>
-              <a:rPr lang="nl-NL" dirty="0" smtClean="0"/>
-              <a:t> </a:t>
-            </a:r>
-            <a:r>
-              <a:rPr lang="nl-NL" dirty="0" err="1" smtClean="0"/>
-              <a:t>NaN</a:t>
-            </a:r>
-            <a:r>
-              <a:rPr lang="nl-NL" dirty="0" smtClean="0"/>
-              <a:t> </a:t>
-            </a:r>
-            <a:r>
-              <a:rPr lang="nl-NL" dirty="0" err="1" smtClean="0"/>
-              <a:t>values</a:t>
-            </a:r>
-            <a:r>
-              <a:rPr lang="nl-NL" dirty="0" smtClean="0"/>
-              <a:t> means </a:t>
-            </a:r>
-            <a:r>
-              <a:rPr lang="nl-NL" dirty="0" err="1" smtClean="0"/>
-              <a:t>that</a:t>
-            </a:r>
-            <a:r>
-              <a:rPr lang="nl-NL" dirty="0" smtClean="0"/>
-              <a:t> </a:t>
-            </a:r>
-            <a:r>
-              <a:rPr lang="nl-NL" dirty="0" err="1" smtClean="0"/>
-              <a:t>some</a:t>
-            </a:r>
-            <a:r>
-              <a:rPr lang="nl-NL" dirty="0" smtClean="0"/>
-              <a:t> </a:t>
-            </a:r>
-            <a:r>
-              <a:rPr lang="nl-NL" dirty="0" err="1" smtClean="0"/>
-              <a:t>numerical</a:t>
-            </a:r>
-            <a:r>
-              <a:rPr lang="nl-NL" dirty="0" smtClean="0"/>
-              <a:t> data </a:t>
-            </a:r>
-            <a:r>
-              <a:rPr lang="nl-NL" dirty="0" err="1" smtClean="0">
-                <a:solidFill>
-                  <a:srgbClr val="C00000"/>
-                </a:solidFill>
-              </a:rPr>
-              <a:t>can</a:t>
-            </a:r>
-            <a:r>
-              <a:rPr lang="nl-NL" dirty="0" smtClean="0">
-                <a:solidFill>
-                  <a:srgbClr val="C00000"/>
-                </a:solidFill>
-              </a:rPr>
-              <a:t> </a:t>
-            </a:r>
-            <a:r>
-              <a:rPr lang="nl-NL" dirty="0" err="1" smtClean="0">
-                <a:solidFill>
-                  <a:srgbClr val="C00000"/>
-                </a:solidFill>
-              </a:rPr>
-              <a:t>not</a:t>
-            </a:r>
-            <a:r>
-              <a:rPr lang="nl-NL" dirty="0" smtClean="0">
-                <a:solidFill>
-                  <a:srgbClr val="C00000"/>
-                </a:solidFill>
-              </a:rPr>
-              <a:t> </a:t>
-            </a:r>
-            <a:r>
-              <a:rPr lang="nl-NL" dirty="0" err="1" smtClean="0">
-                <a:solidFill>
-                  <a:srgbClr val="C00000"/>
-                </a:solidFill>
-              </a:rPr>
-              <a:t>be</a:t>
-            </a:r>
-            <a:r>
-              <a:rPr lang="nl-NL" dirty="0" smtClean="0">
-                <a:solidFill>
-                  <a:srgbClr val="C00000"/>
-                </a:solidFill>
-              </a:rPr>
-              <a:t> </a:t>
-            </a:r>
-            <a:r>
-              <a:rPr lang="nl-NL" dirty="0" err="1" smtClean="0">
-                <a:solidFill>
-                  <a:srgbClr val="C00000"/>
-                </a:solidFill>
-              </a:rPr>
-              <a:t>used</a:t>
-            </a:r>
-            <a:r>
-              <a:rPr lang="nl-NL" dirty="0" smtClean="0"/>
-              <a:t>. </a:t>
-            </a:r>
-            <a:r>
-              <a:rPr lang="nl-NL" dirty="0" err="1" smtClean="0"/>
-              <a:t>Categorical</a:t>
-            </a:r>
-            <a:r>
-              <a:rPr lang="nl-NL" dirty="0" smtClean="0"/>
-              <a:t> </a:t>
-            </a:r>
-            <a:r>
-              <a:rPr lang="nl-NL" dirty="0" err="1" smtClean="0"/>
-              <a:t>treats</a:t>
-            </a:r>
-            <a:r>
-              <a:rPr lang="nl-NL" dirty="0" smtClean="0"/>
-              <a:t> </a:t>
-            </a:r>
-            <a:r>
-              <a:rPr lang="nl-NL" dirty="0" err="1" smtClean="0"/>
-              <a:t>NaN</a:t>
-            </a:r>
-            <a:r>
-              <a:rPr lang="nl-NL" dirty="0" smtClean="0"/>
-              <a:t> data as a </a:t>
-            </a:r>
-            <a:r>
-              <a:rPr lang="nl-NL" dirty="0" smtClean="0">
-                <a:solidFill>
-                  <a:srgbClr val="C00000"/>
-                </a:solidFill>
-              </a:rPr>
-              <a:t>separate </a:t>
-            </a:r>
-            <a:r>
-              <a:rPr lang="nl-NL" dirty="0" err="1" smtClean="0">
-                <a:solidFill>
-                  <a:srgbClr val="C00000"/>
-                </a:solidFill>
-              </a:rPr>
-              <a:t>category</a:t>
-            </a:r>
-            <a:endParaRPr lang="nl-NL" dirty="0" smtClean="0">
-              <a:solidFill>
-                <a:srgbClr val="C00000"/>
-              </a:solidFill>
-            </a:endParaRPr>
+            <a:endParaRPr lang="nl-NL" dirty="0" smtClean="0"/>
           </a:p>
         </p:txBody>
       </p:sp>
@@ -7907,8 +7732,8 @@
           </a:p>
         </p:txBody>
       </p:sp>
-      <mc:AlternateContent xmlns:mc="http://schemas.openxmlformats.org/markup-compatibility/2006">
-        <mc:Choice xmlns:a14="http://schemas.microsoft.com/office/drawing/2010/main" Requires="a14">
+      <mc:AlternateContent xmlns:mc="http://schemas.openxmlformats.org/markup-compatibility/2006" xmlns:a14="http://schemas.microsoft.com/office/drawing/2010/main">
+        <mc:Choice Requires="a14">
           <p:sp>
             <p:nvSpPr>
               <p:cNvPr id="3" name="Tijdelijke aanduiding voor inhoud 2"/>
@@ -7939,11 +7764,7 @@
                 </a:r>
                 <a:r>
                   <a:rPr lang="en-US" dirty="0" smtClean="0"/>
-                  <a:t>(RMSLE)		</a:t>
-                </a:r>
-                <a:r>
-                  <a:rPr lang="en-US" dirty="0" smtClean="0"/>
-                  <a:t> </a:t>
+                  <a:t>(RMSLE)		 </a:t>
                 </a:r>
                 <a14:m>
                   <m:oMath xmlns:m="http://schemas.openxmlformats.org/officeDocument/2006/math">
@@ -8205,11 +8026,7 @@
                 </a:r>
                 <a:r>
                   <a:rPr lang="en-US" dirty="0" smtClean="0"/>
-                  <a:t>, for internal </a:t>
-                </a:r>
-                <a:r>
-                  <a:rPr lang="en-US" dirty="0" smtClean="0"/>
-                  <a:t>validation</a:t>
+                  <a:t>, for internal validation</a:t>
                 </a:r>
               </a:p>
               <a:p>
@@ -8298,7 +8115,7 @@
             </p:txBody>
           </p:sp>
         </mc:Choice>
-        <mc:Fallback>
+        <mc:Fallback xmlns="">
           <p:sp>
             <p:nvSpPr>
               <p:cNvPr id="3" name="Tijdelijke aanduiding voor inhoud 2"/>
@@ -8630,7 +8447,6 @@
               <a:rPr lang="nl-NL" dirty="0" smtClean="0"/>
               <a:t>)</a:t>
             </a:r>
-            <a:endParaRPr lang="nl-NL" dirty="0" smtClean="0"/>
           </a:p>
           <a:p>
             <a:pPr marL="0" indent="0">
@@ -8774,11 +8590,7 @@
             </a:r>
             <a:r>
               <a:rPr lang="nl-NL" dirty="0" smtClean="0"/>
-              <a:t> </a:t>
-            </a:r>
-            <a:r>
-              <a:rPr lang="nl-NL" dirty="0" smtClean="0"/>
-              <a:t>later </a:t>
+              <a:t> later </a:t>
             </a:r>
             <a:r>
               <a:rPr lang="nl-NL" dirty="0" err="1" smtClean="0"/>
@@ -14619,33 +14431,6 @@
           </a:p>
           <a:p>
             <a:r>
-              <a:rPr lang="nl-NL" dirty="0" smtClean="0">
-                <a:solidFill>
-                  <a:srgbClr val="C00000"/>
-                </a:solidFill>
-              </a:rPr>
-              <a:t>Pre-processing</a:t>
-            </a:r>
-            <a:r>
-              <a:rPr lang="nl-NL" dirty="0" smtClean="0"/>
-              <a:t> </a:t>
-            </a:r>
-            <a:r>
-              <a:rPr lang="nl-NL" dirty="0" err="1" smtClean="0"/>
-              <a:t>helped</a:t>
-            </a:r>
-            <a:r>
-              <a:rPr lang="nl-NL" dirty="0" smtClean="0"/>
-              <a:t> </a:t>
-            </a:r>
-            <a:r>
-              <a:rPr lang="nl-NL" dirty="0" err="1" smtClean="0"/>
-              <a:t>tremendously</a:t>
-            </a:r>
-            <a:endParaRPr lang="nl-NL" dirty="0"/>
-          </a:p>
-          <a:p>
-            <a:r>
               <a:rPr lang="nl-NL" dirty="0" err="1" smtClean="0"/>
               <a:t>Compensating</a:t>
             </a:r>
@@ -14831,55 +14616,6 @@
                                           <p:spTgt spid="3">
                                             <p:txEl>
                                               <p:pRg st="3" end="3"/>
-                                            </p:txEl>
-                                          </p:spTgt>
-                                        </p:tgtEl>
-                                        <p:attrNameLst>
-                                          <p:attrName>style.visibility</p:attrName>
-                                        </p:attrNameLst>
-                                      </p:cBhvr>
-                                      <p:to>
-                                        <p:strVal val="visible"/>
-                                      </p:to>
-                                    </p:set>
-                                  </p:childTnLst>
-                                </p:cTn>
-                              </p:par>
-                            </p:childTnLst>
-                          </p:cTn>
-                        </p:par>
-                      </p:childTnLst>
-                    </p:cTn>
-                  </p:par>
-                  <p:par>
-                    <p:cTn id="15" fill="hold">
-                      <p:stCondLst>
-                        <p:cond delay="indefinite"/>
-                      </p:stCondLst>
-                      <p:childTnLst>
-                        <p:par>
-                          <p:cTn id="16" fill="hold">
-                            <p:stCondLst>
-                              <p:cond delay="0"/>
-                            </p:stCondLst>
-                            <p:childTnLst>
-                              <p:par>
-                                <p:cTn id="17" presetID="1" presetClass="entr" presetSubtype="0" fill="hold" nodeType="clickEffect">
-                                  <p:stCondLst>
-                                    <p:cond delay="0"/>
-                                  </p:stCondLst>
-                                  <p:childTnLst>
-                                    <p:set>
-                                      <p:cBhvr>
-                                        <p:cTn id="18" dur="1" fill="hold">
-                                          <p:stCondLst>
-                                            <p:cond delay="0"/>
-                                          </p:stCondLst>
-                                        </p:cTn>
-                                        <p:tgtEl>
-                                          <p:spTgt spid="3">
-                                            <p:txEl>
-                                              <p:pRg st="4" end="4"/>
                                             </p:txEl>
                                           </p:spTgt>
                                         </p:tgtEl>

</xml_diff>